<commit_message>
Added Unit 4 info
</commit_message>
<xml_diff>
--- a/Unit04/Chad_Madding_Unit 4 For Live Session.pptx
+++ b/Unit04/Chad_Madding_Unit 4 For Live Session.pptx
@@ -213,7 +213,7 @@
           <a:p>
             <a:fld id="{F91415B4-81E4-4AC4-90AB-397CCE382C1C}" type="datetimeFigureOut">
               <a:rPr lang="en-US" smtClean="0"/>
-              <a:t>1/22/2020</a:t>
+              <a:t>1/27/2020</a:t>
             </a:fld>
             <a:endParaRPr lang="en-US"/>
           </a:p>
@@ -625,7 +625,7 @@
           <a:p>
             <a:fld id="{1D8BD707-D9CF-40AE-B4C6-C98DA3205C09}" type="datetimeFigureOut">
               <a:rPr lang="en-US"/>
-              <a:t>1/22/2020</a:t>
+              <a:t>1/27/2020</a:t>
             </a:fld>
             <a:endParaRPr lang="en-US"/>
           </a:p>
@@ -802,7 +802,7 @@
           <a:p>
             <a:fld id="{1D8BD707-D9CF-40AE-B4C6-C98DA3205C09}" type="datetimeFigureOut">
               <a:rPr lang="en-US"/>
-              <a:t>1/22/2020</a:t>
+              <a:t>1/27/2020</a:t>
             </a:fld>
             <a:endParaRPr lang="en-US"/>
           </a:p>
@@ -1016,7 +1016,7 @@
           <a:p>
             <a:fld id="{1D8BD707-D9CF-40AE-B4C6-C98DA3205C09}" type="datetimeFigureOut">
               <a:rPr lang="en-US"/>
-              <a:t>1/22/2020</a:t>
+              <a:t>1/27/2020</a:t>
             </a:fld>
             <a:endParaRPr lang="en-US"/>
           </a:p>
@@ -1164,7 +1164,7 @@
           <a:p>
             <a:fld id="{1D8BD707-D9CF-40AE-B4C6-C98DA3205C09}" type="datetimeFigureOut">
               <a:rPr lang="en-US"/>
-              <a:t>1/22/2020</a:t>
+              <a:t>1/27/2020</a:t>
             </a:fld>
             <a:endParaRPr lang="en-US"/>
           </a:p>
@@ -1283,7 +1283,7 @@
           <a:p>
             <a:fld id="{1D8BD707-D9CF-40AE-B4C6-C98DA3205C09}" type="datetimeFigureOut">
               <a:rPr lang="en-US"/>
-              <a:t>1/22/2020</a:t>
+              <a:t>1/27/2020</a:t>
             </a:fld>
             <a:endParaRPr lang="en-US"/>
           </a:p>
@@ -1600,7 +1600,7 @@
           <a:p>
             <a:fld id="{1D8BD707-D9CF-40AE-B4C6-C98DA3205C09}" type="datetimeFigureOut">
               <a:rPr lang="en-US"/>
-              <a:t>1/22/2020</a:t>
+              <a:t>1/27/2020</a:t>
             </a:fld>
             <a:endParaRPr lang="en-US"/>
           </a:p>
@@ -2071,52 +2071,6 @@
           </a:p>
         </p:txBody>
       </p:sp>
-      <p:sp>
-        <p:nvSpPr>
-          <p:cNvPr id="10" name="Rectangle 9">
-            <a:extLst>
-              <a:ext uri="{FF2B5EF4-FFF2-40B4-BE49-F238E27FC236}">
-                <a16:creationId xmlns:a16="http://schemas.microsoft.com/office/drawing/2014/main" id="{7E8DBD5C-7EAA-4B7B-B557-DDF3035A6248}"/>
-              </a:ext>
-            </a:extLst>
-          </p:cNvPr>
-          <p:cNvSpPr/>
-          <p:nvPr/>
-        </p:nvSpPr>
-        <p:spPr>
-          <a:xfrm>
-            <a:off x="152400" y="5029200"/>
-            <a:ext cx="8839200" cy="1200329"/>
-          </a:xfrm>
-          <a:prstGeom prst="rect">
-            <a:avLst/>
-          </a:prstGeom>
-        </p:spPr>
-        <p:txBody>
-          <a:bodyPr wrap="square">
-            <a:spAutoFit/>
-          </a:bodyPr>
-          <a:lstStyle/>
-          <a:p>
-            <a:r>
-              <a:rPr lang="en-US" sz="1200" b="1" u="sng" dirty="0"/>
-              <a:t>Condition 3:</a:t>
-            </a:r>
-          </a:p>
-          <a:p>
-            <a:r>
-              <a:rPr lang="en-US" sz="1200" dirty="0"/>
-              <a:t>Evidence of the annual seasonal trend in the series is found in the ACF (of all the data, to the far right) with a spike in the autocorrelation at lag 12.</a:t>
-            </a:r>
-          </a:p>
-          <a:p>
-            <a:r>
-              <a:rPr lang="en-US" sz="1200" dirty="0"/>
-              <a:t>Judging from the ACFs of the first half (bottom left) and the second half (bottom right) of the series, we see evidence that the autocorrelations do not depend on where they are in time, rather just on the lag.  We can see and conclude from the ACFs that the signal on the right is not stationary (since later lags exceed the confidence interval). </a:t>
-            </a:r>
-          </a:p>
-        </p:txBody>
-      </p:sp>
       <p:pic>
         <p:nvPicPr>
           <p:cNvPr id="3" name="Picture 2">
@@ -2139,14 +2093,48 @@
         </p:blipFill>
         <p:spPr>
           <a:xfrm>
-            <a:off x="1994011" y="1135380"/>
-            <a:ext cx="5155975" cy="3866981"/>
+            <a:off x="1104899" y="1143000"/>
+            <a:ext cx="6934199" cy="5200649"/>
           </a:xfrm>
           <a:prstGeom prst="rect">
             <a:avLst/>
           </a:prstGeom>
         </p:spPr>
       </p:pic>
+      <p:sp>
+        <p:nvSpPr>
+          <p:cNvPr id="5" name="Rectangle 4">
+            <a:extLst>
+              <a:ext uri="{FF2B5EF4-FFF2-40B4-BE49-F238E27FC236}">
+                <a16:creationId xmlns:a16="http://schemas.microsoft.com/office/drawing/2014/main" id="{B8575B32-F17E-43B2-A048-9905C10633CD}"/>
+              </a:ext>
+            </a:extLst>
+          </p:cNvPr>
+          <p:cNvSpPr/>
+          <p:nvPr/>
+        </p:nvSpPr>
+        <p:spPr>
+          <a:xfrm>
+            <a:off x="76200" y="5257800"/>
+            <a:ext cx="9067800" cy="830997"/>
+          </a:xfrm>
+          <a:prstGeom prst="rect">
+            <a:avLst/>
+          </a:prstGeom>
+        </p:spPr>
+        <p:txBody>
+          <a:bodyPr wrap="square">
+            <a:spAutoFit/>
+          </a:bodyPr>
+          <a:lstStyle/>
+          <a:p>
+            <a:r>
+              <a:rPr lang="en-US" sz="1600" dirty="0"/>
+              <a:t>I feel the most appropriate model would be the AR(9). The AR(8) model was not stationary and the first 2 did not produce results close to the output needed for the Wal-Mart data. The breakdown of the AR(9) model is on the next slide. </a:t>
+            </a:r>
+          </a:p>
+        </p:txBody>
+      </p:sp>
     </p:spTree>
     <p:extLst>
       <p:ext uri="{BB962C8B-B14F-4D97-AF65-F5344CB8AC3E}">
@@ -2179,46 +2167,6 @@
       </p:grpSpPr>
       <p:sp>
         <p:nvSpPr>
-          <p:cNvPr id="2" name="Title 1">
-            <a:extLst>
-              <a:ext uri="{FF2B5EF4-FFF2-40B4-BE49-F238E27FC236}">
-                <a16:creationId xmlns:a16="http://schemas.microsoft.com/office/drawing/2014/main" id="{2422834A-04E2-4851-8CDA-4F4EE7FD454B}"/>
-              </a:ext>
-            </a:extLst>
-          </p:cNvPr>
-          <p:cNvSpPr>
-            <a:spLocks noGrp="1"/>
-          </p:cNvSpPr>
-          <p:nvPr>
-            <p:ph type="title"/>
-          </p:nvPr>
-        </p:nvSpPr>
-        <p:spPr>
-          <a:xfrm>
-            <a:off x="152401" y="439420"/>
-            <a:ext cx="8915400" cy="553998"/>
-          </a:xfrm>
-        </p:spPr>
-        <p:txBody>
-          <a:bodyPr/>
-          <a:lstStyle/>
-          <a:p>
-            <a:r>
-              <a:rPr lang="en-US" sz="1800" dirty="0"/>
-              <a:t>The client believes there is yearly and weekly seasonality in the data.</a:t>
-            </a:r>
-            <a:br>
-              <a:rPr lang="en-US" sz="1800" dirty="0"/>
-            </a:br>
-            <a:r>
-              <a:rPr lang="en-US" sz="1800" dirty="0"/>
-              <a:t>Is there evidence of this with respect to the spectral density?</a:t>
-            </a:r>
-          </a:p>
-        </p:txBody>
-      </p:sp>
-      <p:sp>
-        <p:nvSpPr>
           <p:cNvPr id="3" name="object 3">
             <a:extLst>
               <a:ext uri="{FF2B5EF4-FFF2-40B4-BE49-F238E27FC236}">
@@ -2254,10 +2202,10 @@
       </p:sp>
       <p:sp>
         <p:nvSpPr>
-          <p:cNvPr id="4" name="Rectangle 3">
+          <p:cNvPr id="7" name="Rectangle 6">
             <a:extLst>
               <a:ext uri="{FF2B5EF4-FFF2-40B4-BE49-F238E27FC236}">
-                <a16:creationId xmlns:a16="http://schemas.microsoft.com/office/drawing/2014/main" id="{919B1E29-DBAC-42C8-B9AA-5B7C8790E673}"/>
+                <a16:creationId xmlns:a16="http://schemas.microsoft.com/office/drawing/2014/main" id="{74E6F42A-F152-4E9D-8627-48E4C5EC049F}"/>
               </a:ext>
             </a:extLst>
           </p:cNvPr>
@@ -2266,8 +2214,8 @@
         </p:nvSpPr>
         <p:spPr>
           <a:xfrm>
-            <a:off x="266699" y="4495800"/>
-            <a:ext cx="8610600" cy="1384995"/>
+            <a:off x="76200" y="1739205"/>
+            <a:ext cx="8915400" cy="1384995"/>
           </a:xfrm>
           <a:prstGeom prst="rect">
             <a:avLst/>
@@ -2280,26 +2228,379 @@
           <a:lstStyle/>
           <a:p>
             <a:r>
-              <a:rPr lang="en-US" sz="1200" b="1" u="sng" dirty="0"/>
-              <a:t>Spectral Density:</a:t>
-            </a:r>
-          </a:p>
-          <a:p>
-            <a:r>
               <a:rPr lang="en-US" sz="1200" dirty="0"/>
-              <a:t>There is a peak in the spectral density at 0 which is evidence of some wandering behavior that is apparent in the realization.</a:t>
-            </a:r>
-          </a:p>
-          <a:p>
+              <a:t># </a:t>
+            </a:r>
+            <a:r>
+              <a:rPr lang="en-US" sz="1200" dirty="0" err="1"/>
+              <a:t>X_t</a:t>
+            </a:r>
             <a:r>
               <a:rPr lang="en-US" sz="1200" dirty="0"/>
-              <a:t>There is also evidence of cyclic behavior in the realization which is supported both by our intuition and the spectral density. There is a peak at about .083 which is indicative of a period at 1/.083 = 12, showing evidence of some monthly seasonality. This makes sense intuitively as an annual cycle seems to make sense in this sales data.</a:t>
-            </a:r>
+              <a:t> -1.384X_t-1 +.359X_t-2 +.309X_t-3 -.063X_t-4 -.317X_t-5 +.140X_t-6 +.0587X_t-7 +.199X_t-8  -.2877X_t-9 = </a:t>
+            </a:r>
+            <a:r>
+              <a:rPr lang="en-US" sz="1200" dirty="0" err="1"/>
+              <a:t>a_t</a:t>
+            </a:r>
+            <a:endParaRPr lang="en-US" sz="1200" dirty="0"/>
           </a:p>
           <a:p>
             <a:r>
               <a:rPr lang="en-US" sz="1200" dirty="0"/>
-              <a:t>There also looks to be evidence of a peak in the spectral density at .25 and .41. These would correspond to a period of 4 and 2.4. Since this data has been grouped by months this is evidence of some weekly seasonality.</a:t>
+              <a:t>#Factor Table</a:t>
+            </a:r>
+          </a:p>
+          <a:p>
+            <a:r>
+              <a:rPr lang="en-US" sz="1200" dirty="0" err="1"/>
+              <a:t>factor.wge</a:t>
+            </a:r>
+            <a:r>
+              <a:rPr lang="en-US" sz="1200" dirty="0"/>
+              <a:t>(phi = c(1.384, -.359, -.309, .063, .317, -.140, -.0587, -.199, .2877))</a:t>
+            </a:r>
+          </a:p>
+          <a:p>
+            <a:endParaRPr lang="en-US" sz="1200" dirty="0"/>
+          </a:p>
+          <a:p>
+            <a:r>
+              <a:rPr lang="en-US" sz="1200" dirty="0"/>
+              <a:t>#Plotting a realization along with true</a:t>
+            </a:r>
+          </a:p>
+          <a:p>
+            <a:r>
+              <a:rPr lang="en-US" sz="1200" dirty="0"/>
+              <a:t># autocorrelations and spectral density</a:t>
+            </a:r>
+          </a:p>
+          <a:p>
+            <a:r>
+              <a:rPr lang="en-US" sz="1200" dirty="0" err="1"/>
+              <a:t>plotts.true.wge</a:t>
+            </a:r>
+            <a:r>
+              <a:rPr lang="en-US" sz="1200" dirty="0"/>
+              <a:t>(phi = c(1.384, -.359, -.309, .063, .317, -.140, -.0587, -.199, .2877))</a:t>
+            </a:r>
+          </a:p>
+        </p:txBody>
+      </p:sp>
+      <p:pic>
+        <p:nvPicPr>
+          <p:cNvPr id="8" name="Picture 7">
+            <a:extLst>
+              <a:ext uri="{FF2B5EF4-FFF2-40B4-BE49-F238E27FC236}">
+                <a16:creationId xmlns:a16="http://schemas.microsoft.com/office/drawing/2014/main" id="{7F1D418B-8EEB-477B-8A53-B8508073542C}"/>
+              </a:ext>
+            </a:extLst>
+          </p:cNvPr>
+          <p:cNvPicPr>
+            <a:picLocks noChangeAspect="1"/>
+          </p:cNvPicPr>
+          <p:nvPr/>
+        </p:nvPicPr>
+        <p:blipFill>
+          <a:blip r:embed="rId3"/>
+          <a:stretch>
+            <a:fillRect/>
+          </a:stretch>
+        </p:blipFill>
+        <p:spPr>
+          <a:xfrm>
+            <a:off x="813868" y="1318213"/>
+            <a:ext cx="7440063" cy="238158"/>
+          </a:xfrm>
+          <a:prstGeom prst="rect">
+            <a:avLst/>
+          </a:prstGeom>
+        </p:spPr>
+      </p:pic>
+      <p:pic>
+        <p:nvPicPr>
+          <p:cNvPr id="9" name="Picture 8">
+            <a:extLst>
+              <a:ext uri="{FF2B5EF4-FFF2-40B4-BE49-F238E27FC236}">
+                <a16:creationId xmlns:a16="http://schemas.microsoft.com/office/drawing/2014/main" id="{F01AAFE2-EFCE-475E-8CBD-5823B4EDA7EF}"/>
+              </a:ext>
+            </a:extLst>
+          </p:cNvPr>
+          <p:cNvPicPr>
+            <a:picLocks noChangeAspect="1"/>
+          </p:cNvPicPr>
+          <p:nvPr/>
+        </p:nvPicPr>
+        <p:blipFill>
+          <a:blip r:embed="rId4"/>
+          <a:stretch>
+            <a:fillRect/>
+          </a:stretch>
+        </p:blipFill>
+        <p:spPr>
+          <a:xfrm>
+            <a:off x="951825" y="3406806"/>
+            <a:ext cx="2705775" cy="1448762"/>
+          </a:xfrm>
+          <a:prstGeom prst="rect">
+            <a:avLst/>
+          </a:prstGeom>
+        </p:spPr>
+      </p:pic>
+      <p:sp>
+        <p:nvSpPr>
+          <p:cNvPr id="11" name="Rectangle 10">
+            <a:extLst>
+              <a:ext uri="{FF2B5EF4-FFF2-40B4-BE49-F238E27FC236}">
+                <a16:creationId xmlns:a16="http://schemas.microsoft.com/office/drawing/2014/main" id="{76A85253-B392-42C9-9D30-7595A70D8D19}"/>
+              </a:ext>
+            </a:extLst>
+          </p:cNvPr>
+          <p:cNvSpPr/>
+          <p:nvPr/>
+        </p:nvSpPr>
+        <p:spPr>
+          <a:xfrm>
+            <a:off x="893067" y="3129807"/>
+            <a:ext cx="2819400" cy="276999"/>
+          </a:xfrm>
+          <a:prstGeom prst="rect">
+            <a:avLst/>
+          </a:prstGeom>
+        </p:spPr>
+        <p:txBody>
+          <a:bodyPr wrap="square">
+            <a:spAutoFit/>
+          </a:bodyPr>
+          <a:lstStyle/>
+          <a:p>
+            <a:pPr algn="ctr"/>
+            <a:r>
+              <a:rPr lang="en-US" sz="1200" dirty="0"/>
+              <a:t>Original Wal-Mart Data</a:t>
+            </a:r>
+          </a:p>
+        </p:txBody>
+      </p:sp>
+      <p:pic>
+        <p:nvPicPr>
+          <p:cNvPr id="12" name="Picture 11">
+            <a:extLst>
+              <a:ext uri="{FF2B5EF4-FFF2-40B4-BE49-F238E27FC236}">
+                <a16:creationId xmlns:a16="http://schemas.microsoft.com/office/drawing/2014/main" id="{0B316988-7840-4D2E-8F48-9F3328E61AF7}"/>
+              </a:ext>
+            </a:extLst>
+          </p:cNvPr>
+          <p:cNvPicPr>
+            <a:picLocks noChangeAspect="1"/>
+          </p:cNvPicPr>
+          <p:nvPr/>
+        </p:nvPicPr>
+        <p:blipFill>
+          <a:blip r:embed="rId5"/>
+          <a:stretch>
+            <a:fillRect/>
+          </a:stretch>
+        </p:blipFill>
+        <p:spPr>
+          <a:xfrm>
+            <a:off x="914400" y="4876800"/>
+            <a:ext cx="2727706" cy="1448762"/>
+          </a:xfrm>
+          <a:prstGeom prst="rect">
+            <a:avLst/>
+          </a:prstGeom>
+        </p:spPr>
+      </p:pic>
+      <p:sp>
+        <p:nvSpPr>
+          <p:cNvPr id="14" name="Rectangle 13">
+            <a:extLst>
+              <a:ext uri="{FF2B5EF4-FFF2-40B4-BE49-F238E27FC236}">
+                <a16:creationId xmlns:a16="http://schemas.microsoft.com/office/drawing/2014/main" id="{B77E2CBA-CA7D-448C-84ED-521584D107A8}"/>
+              </a:ext>
+            </a:extLst>
+          </p:cNvPr>
+          <p:cNvSpPr/>
+          <p:nvPr/>
+        </p:nvSpPr>
+        <p:spPr>
+          <a:xfrm>
+            <a:off x="4320506" y="3134348"/>
+            <a:ext cx="2842294" cy="276999"/>
+          </a:xfrm>
+          <a:prstGeom prst="rect">
+            <a:avLst/>
+          </a:prstGeom>
+        </p:spPr>
+        <p:txBody>
+          <a:bodyPr wrap="square">
+            <a:spAutoFit/>
+          </a:bodyPr>
+          <a:lstStyle/>
+          <a:p>
+            <a:pPr algn="ctr"/>
+            <a:r>
+              <a:rPr lang="en-US" sz="1200" dirty="0"/>
+              <a:t>Modeled Data</a:t>
+            </a:r>
+          </a:p>
+        </p:txBody>
+      </p:sp>
+      <p:pic>
+        <p:nvPicPr>
+          <p:cNvPr id="15" name="Picture 14">
+            <a:extLst>
+              <a:ext uri="{FF2B5EF4-FFF2-40B4-BE49-F238E27FC236}">
+                <a16:creationId xmlns:a16="http://schemas.microsoft.com/office/drawing/2014/main" id="{91BB7D01-A1FC-492C-BA49-5E2A0E97C5B1}"/>
+              </a:ext>
+            </a:extLst>
+          </p:cNvPr>
+          <p:cNvPicPr>
+            <a:picLocks noChangeAspect="1"/>
+          </p:cNvPicPr>
+          <p:nvPr/>
+        </p:nvPicPr>
+        <p:blipFill>
+          <a:blip r:embed="rId6"/>
+          <a:stretch>
+            <a:fillRect/>
+          </a:stretch>
+        </p:blipFill>
+        <p:spPr>
+          <a:xfrm>
+            <a:off x="4288532" y="3406806"/>
+            <a:ext cx="2819400" cy="1440165"/>
+          </a:xfrm>
+          <a:prstGeom prst="rect">
+            <a:avLst/>
+          </a:prstGeom>
+        </p:spPr>
+      </p:pic>
+      <p:pic>
+        <p:nvPicPr>
+          <p:cNvPr id="16" name="Picture 15">
+            <a:extLst>
+              <a:ext uri="{FF2B5EF4-FFF2-40B4-BE49-F238E27FC236}">
+                <a16:creationId xmlns:a16="http://schemas.microsoft.com/office/drawing/2014/main" id="{F92BD00A-6828-4B53-90D7-4BD505873277}"/>
+              </a:ext>
+            </a:extLst>
+          </p:cNvPr>
+          <p:cNvPicPr>
+            <a:picLocks noChangeAspect="1"/>
+          </p:cNvPicPr>
+          <p:nvPr/>
+        </p:nvPicPr>
+        <p:blipFill>
+          <a:blip r:embed="rId7"/>
+          <a:stretch>
+            <a:fillRect/>
+          </a:stretch>
+        </p:blipFill>
+        <p:spPr>
+          <a:xfrm>
+            <a:off x="4256123" y="4929342"/>
+            <a:ext cx="2830477" cy="1440165"/>
+          </a:xfrm>
+          <a:prstGeom prst="rect">
+            <a:avLst/>
+          </a:prstGeom>
+        </p:spPr>
+      </p:pic>
+      <p:sp>
+        <p:nvSpPr>
+          <p:cNvPr id="17" name="Rectangle 16">
+            <a:extLst>
+              <a:ext uri="{FF2B5EF4-FFF2-40B4-BE49-F238E27FC236}">
+                <a16:creationId xmlns:a16="http://schemas.microsoft.com/office/drawing/2014/main" id="{5C020D54-294E-4C66-ABE8-1EA33466FC5C}"/>
+              </a:ext>
+            </a:extLst>
+          </p:cNvPr>
+          <p:cNvSpPr/>
+          <p:nvPr/>
+        </p:nvSpPr>
+        <p:spPr>
+          <a:xfrm>
+            <a:off x="76199" y="349993"/>
+            <a:ext cx="8915400" cy="830997"/>
+          </a:xfrm>
+          <a:prstGeom prst="rect">
+            <a:avLst/>
+          </a:prstGeom>
+        </p:spPr>
+        <p:txBody>
+          <a:bodyPr wrap="square">
+            <a:spAutoFit/>
+          </a:bodyPr>
+          <a:lstStyle/>
+          <a:p>
+            <a:r>
+              <a:rPr lang="en-US" sz="1200" dirty="0"/>
+              <a:t>Comparing the autocorrelations and the spectral density of the original data and the model we can see the DNA of the original in the modeled data. The AC show a very slight dampening in both. The spectral density is a bit off but we can see peaks in the original data at 0, a small bump around .03, around .15, close to .29 and one final one around .43. Looking at the System Frequencies of the model shows peeks at 0.0737, 0.1705, 0.3186 and 0.4318.</a:t>
+            </a:r>
+          </a:p>
+        </p:txBody>
+      </p:sp>
+      <p:sp>
+        <p:nvSpPr>
+          <p:cNvPr id="18" name="Rectangle 17">
+            <a:extLst>
+              <a:ext uri="{FF2B5EF4-FFF2-40B4-BE49-F238E27FC236}">
+                <a16:creationId xmlns:a16="http://schemas.microsoft.com/office/drawing/2014/main" id="{067A88EB-0F2E-4309-9471-A589EA87C244}"/>
+              </a:ext>
+            </a:extLst>
+          </p:cNvPr>
+          <p:cNvSpPr/>
+          <p:nvPr/>
+        </p:nvSpPr>
+        <p:spPr>
+          <a:xfrm>
+            <a:off x="7239000" y="5108900"/>
+            <a:ext cx="914400" cy="861774"/>
+          </a:xfrm>
+          <a:prstGeom prst="rect">
+            <a:avLst/>
+          </a:prstGeom>
+        </p:spPr>
+        <p:txBody>
+          <a:bodyPr wrap="square">
+            <a:spAutoFit/>
+          </a:bodyPr>
+          <a:lstStyle/>
+          <a:p>
+            <a:pPr algn="ctr"/>
+            <a:r>
+              <a:rPr lang="en-US" sz="1000" dirty="0"/>
+              <a:t>System Freq </a:t>
+            </a:r>
+          </a:p>
+          <a:p>
+            <a:pPr algn="ctr"/>
+            <a:r>
+              <a:rPr lang="en-US" sz="1000" dirty="0"/>
+              <a:t>0.0737</a:t>
+            </a:r>
+          </a:p>
+          <a:p>
+            <a:pPr algn="ctr"/>
+            <a:r>
+              <a:rPr lang="en-US" sz="1000" dirty="0"/>
+              <a:t>0.1705</a:t>
+            </a:r>
+          </a:p>
+          <a:p>
+            <a:pPr algn="ctr"/>
+            <a:r>
+              <a:rPr lang="en-US" sz="1000" dirty="0"/>
+              <a:t>0.3186</a:t>
+            </a:r>
+          </a:p>
+          <a:p>
+            <a:pPr algn="ctr"/>
+            <a:r>
+              <a:rPr lang="en-US" sz="1000" dirty="0"/>
+              <a:t>0.4318</a:t>
             </a:r>
           </a:p>
         </p:txBody>
@@ -2336,40 +2637,6 @@
       </p:grpSpPr>
       <p:sp>
         <p:nvSpPr>
-          <p:cNvPr id="3" name="Rectangle 2">
-            <a:extLst>
-              <a:ext uri="{FF2B5EF4-FFF2-40B4-BE49-F238E27FC236}">
-                <a16:creationId xmlns:a16="http://schemas.microsoft.com/office/drawing/2014/main" id="{1F3DBF47-A324-49E7-B3FE-F8A8D476578C}"/>
-              </a:ext>
-            </a:extLst>
-          </p:cNvPr>
-          <p:cNvSpPr/>
-          <p:nvPr/>
-        </p:nvSpPr>
-        <p:spPr>
-          <a:xfrm>
-            <a:off x="152400" y="381000"/>
-            <a:ext cx="8686800" cy="646331"/>
-          </a:xfrm>
-          <a:prstGeom prst="rect">
-            <a:avLst/>
-          </a:prstGeom>
-        </p:spPr>
-        <p:txBody>
-          <a:bodyPr wrap="square">
-            <a:spAutoFit/>
-          </a:bodyPr>
-          <a:lstStyle/>
-          <a:p>
-            <a:r>
-              <a:rPr lang="en-US" dirty="0"/>
-              <a:t>Take the Walmart data and do a five-point moving average and 51-point moving average. Show the spectral density for each and comment on the results.</a:t>
-            </a:r>
-          </a:p>
-        </p:txBody>
-      </p:sp>
-      <p:sp>
-        <p:nvSpPr>
           <p:cNvPr id="4" name="object 3">
             <a:extLst>
               <a:ext uri="{FF2B5EF4-FFF2-40B4-BE49-F238E27FC236}">
@@ -2405,10 +2672,476 @@
       </p:sp>
       <p:sp>
         <p:nvSpPr>
-          <p:cNvPr id="5" name="Rectangle 4">
+          <p:cNvPr id="8" name="Rectangle 1">
             <a:extLst>
               <a:ext uri="{FF2B5EF4-FFF2-40B4-BE49-F238E27FC236}">
-                <a16:creationId xmlns:a16="http://schemas.microsoft.com/office/drawing/2014/main" id="{BBD66BCD-4E76-4976-AC1F-F75C450C6E33}"/>
+                <a16:creationId xmlns:a16="http://schemas.microsoft.com/office/drawing/2014/main" id="{E7B8F2B6-2DC4-44BE-9282-FA315258A2EC}"/>
+              </a:ext>
+            </a:extLst>
+          </p:cNvPr>
+          <p:cNvSpPr>
+            <a:spLocks noChangeArrowheads="1"/>
+          </p:cNvSpPr>
+          <p:nvPr/>
+        </p:nvSpPr>
+        <p:spPr bwMode="auto">
+          <a:xfrm>
+            <a:off x="304800" y="95071"/>
+            <a:ext cx="8839200" cy="1200329"/>
+          </a:xfrm>
+          <a:prstGeom prst="rect">
+            <a:avLst/>
+          </a:prstGeom>
+          <a:noFill/>
+          <a:ln>
+            <a:noFill/>
+          </a:ln>
+          <a:effectLst/>
+          <a:extLst>
+            <a:ext uri="{909E8E84-426E-40DD-AFC4-6F175D3DCCD1}">
+              <a14:hiddenFill xmlns:a14="http://schemas.microsoft.com/office/drawing/2010/main">
+                <a:solidFill>
+                  <a:schemeClr val="accent1"/>
+                </a:solidFill>
+              </a14:hiddenFill>
+            </a:ext>
+            <a:ext uri="{91240B29-F687-4F45-9708-019B960494DF}">
+              <a14:hiddenLine xmlns:a14="http://schemas.microsoft.com/office/drawing/2010/main" w="9525">
+                <a:solidFill>
+                  <a:schemeClr val="tx1"/>
+                </a:solidFill>
+                <a:miter lim="800000"/>
+                <a:headEnd/>
+                <a:tailEnd/>
+              </a14:hiddenLine>
+            </a:ext>
+            <a:ext uri="{AF507438-7753-43E0-B8FC-AC1667EBCBE1}">
+              <a14:hiddenEffects xmlns:a14="http://schemas.microsoft.com/office/drawing/2010/main">
+                <a:effectLst>
+                  <a:outerShdw dist="35921" dir="2700000" algn="ctr" rotWithShape="0">
+                    <a:schemeClr val="bg2"/>
+                  </a:outerShdw>
+                </a:effectLst>
+              </a14:hiddenEffects>
+            </a:ext>
+          </a:extLst>
+        </p:spPr>
+        <p:txBody>
+          <a:bodyPr vert="horz" wrap="square" lIns="91440" tIns="45720" rIns="91440" bIns="45720" numCol="1" anchor="ctr" anchorCtr="0" compatLnSpc="1">
+            <a:prstTxWarp prst="textNoShape">
+              <a:avLst/>
+            </a:prstTxWarp>
+            <a:spAutoFit/>
+          </a:bodyPr>
+          <a:lstStyle>
+            <a:lvl1pPr eaLnBrk="0" fontAlgn="base" hangingPunct="0">
+              <a:spcBef>
+                <a:spcPct val="0"/>
+              </a:spcBef>
+              <a:spcAft>
+                <a:spcPct val="0"/>
+              </a:spcAft>
+              <a:defRPr>
+                <a:solidFill>
+                  <a:schemeClr val="tx1"/>
+                </a:solidFill>
+                <a:latin typeface="Arial" panose="020B0604020202020204" pitchFamily="34" charset="0"/>
+              </a:defRPr>
+            </a:lvl1pPr>
+            <a:lvl2pPr eaLnBrk="0" fontAlgn="base" hangingPunct="0">
+              <a:spcBef>
+                <a:spcPct val="0"/>
+              </a:spcBef>
+              <a:spcAft>
+                <a:spcPct val="0"/>
+              </a:spcAft>
+              <a:defRPr>
+                <a:solidFill>
+                  <a:schemeClr val="tx1"/>
+                </a:solidFill>
+                <a:latin typeface="Arial" panose="020B0604020202020204" pitchFamily="34" charset="0"/>
+              </a:defRPr>
+            </a:lvl2pPr>
+            <a:lvl3pPr eaLnBrk="0" fontAlgn="base" hangingPunct="0">
+              <a:spcBef>
+                <a:spcPct val="0"/>
+              </a:spcBef>
+              <a:spcAft>
+                <a:spcPct val="0"/>
+              </a:spcAft>
+              <a:defRPr>
+                <a:solidFill>
+                  <a:schemeClr val="tx1"/>
+                </a:solidFill>
+                <a:latin typeface="Arial" panose="020B0604020202020204" pitchFamily="34" charset="0"/>
+              </a:defRPr>
+            </a:lvl3pPr>
+            <a:lvl4pPr eaLnBrk="0" fontAlgn="base" hangingPunct="0">
+              <a:spcBef>
+                <a:spcPct val="0"/>
+              </a:spcBef>
+              <a:spcAft>
+                <a:spcPct val="0"/>
+              </a:spcAft>
+              <a:defRPr>
+                <a:solidFill>
+                  <a:schemeClr val="tx1"/>
+                </a:solidFill>
+                <a:latin typeface="Arial" panose="020B0604020202020204" pitchFamily="34" charset="0"/>
+              </a:defRPr>
+            </a:lvl4pPr>
+            <a:lvl5pPr eaLnBrk="0" fontAlgn="base" hangingPunct="0">
+              <a:spcBef>
+                <a:spcPct val="0"/>
+              </a:spcBef>
+              <a:spcAft>
+                <a:spcPct val="0"/>
+              </a:spcAft>
+              <a:defRPr>
+                <a:solidFill>
+                  <a:schemeClr val="tx1"/>
+                </a:solidFill>
+                <a:latin typeface="Arial" panose="020B0604020202020204" pitchFamily="34" charset="0"/>
+              </a:defRPr>
+            </a:lvl5pPr>
+            <a:lvl6pPr eaLnBrk="0" fontAlgn="base" hangingPunct="0">
+              <a:spcBef>
+                <a:spcPct val="0"/>
+              </a:spcBef>
+              <a:spcAft>
+                <a:spcPct val="0"/>
+              </a:spcAft>
+              <a:defRPr>
+                <a:solidFill>
+                  <a:schemeClr val="tx1"/>
+                </a:solidFill>
+                <a:latin typeface="Arial" panose="020B0604020202020204" pitchFamily="34" charset="0"/>
+              </a:defRPr>
+            </a:lvl6pPr>
+            <a:lvl7pPr eaLnBrk="0" fontAlgn="base" hangingPunct="0">
+              <a:spcBef>
+                <a:spcPct val="0"/>
+              </a:spcBef>
+              <a:spcAft>
+                <a:spcPct val="0"/>
+              </a:spcAft>
+              <a:defRPr>
+                <a:solidFill>
+                  <a:schemeClr val="tx1"/>
+                </a:solidFill>
+                <a:latin typeface="Arial" panose="020B0604020202020204" pitchFamily="34" charset="0"/>
+              </a:defRPr>
+            </a:lvl7pPr>
+            <a:lvl8pPr eaLnBrk="0" fontAlgn="base" hangingPunct="0">
+              <a:spcBef>
+                <a:spcPct val="0"/>
+              </a:spcBef>
+              <a:spcAft>
+                <a:spcPct val="0"/>
+              </a:spcAft>
+              <a:defRPr>
+                <a:solidFill>
+                  <a:schemeClr val="tx1"/>
+                </a:solidFill>
+                <a:latin typeface="Arial" panose="020B0604020202020204" pitchFamily="34" charset="0"/>
+              </a:defRPr>
+            </a:lvl8pPr>
+            <a:lvl9pPr eaLnBrk="0" fontAlgn="base" hangingPunct="0">
+              <a:spcBef>
+                <a:spcPct val="0"/>
+              </a:spcBef>
+              <a:spcAft>
+                <a:spcPct val="0"/>
+              </a:spcAft>
+              <a:defRPr>
+                <a:solidFill>
+                  <a:schemeClr val="tx1"/>
+                </a:solidFill>
+                <a:latin typeface="Arial" panose="020B0604020202020204" pitchFamily="34" charset="0"/>
+              </a:defRPr>
+            </a:lvl9pPr>
+          </a:lstStyle>
+          <a:p>
+            <a:pPr marL="0" marR="0" lvl="0" indent="0" algn="l" defTabSz="914400" rtl="0" eaLnBrk="0" fontAlgn="base" latinLnBrk="0" hangingPunct="0">
+              <a:lnSpc>
+                <a:spcPct val="100000"/>
+              </a:lnSpc>
+              <a:spcBef>
+                <a:spcPct val="0"/>
+              </a:spcBef>
+              <a:spcAft>
+                <a:spcPct val="0"/>
+              </a:spcAft>
+              <a:buClrTx/>
+              <a:buSzTx/>
+              <a:buFontTx/>
+              <a:buNone/>
+              <a:tabLst/>
+            </a:pPr>
+            <a:endParaRPr kumimoji="0" lang="en-US" altLang="en-US" sz="1200" b="0" i="0" u="none" strike="noStrike" cap="none" normalizeH="0" baseline="0" dirty="0">
+              <a:ln>
+                <a:noFill/>
+              </a:ln>
+              <a:solidFill>
+                <a:srgbClr val="282828"/>
+              </a:solidFill>
+              <a:effectLst/>
+              <a:latin typeface="Proxima Nova"/>
+            </a:endParaRPr>
+          </a:p>
+          <a:p>
+            <a:pPr marL="0" marR="0" lvl="0" indent="0" algn="l" defTabSz="914400" rtl="0" eaLnBrk="0" fontAlgn="base" latinLnBrk="0" hangingPunct="0">
+              <a:lnSpc>
+                <a:spcPct val="100000"/>
+              </a:lnSpc>
+              <a:spcBef>
+                <a:spcPct val="0"/>
+              </a:spcBef>
+              <a:spcAft>
+                <a:spcPct val="0"/>
+              </a:spcAft>
+              <a:buClrTx/>
+              <a:buSzTx/>
+              <a:buFontTx/>
+              <a:buNone/>
+              <a:tabLst/>
+            </a:pPr>
+            <a:endParaRPr kumimoji="0" lang="en-US" altLang="en-US" sz="1200" b="0" i="0" u="none" strike="noStrike" cap="none" normalizeH="0" baseline="0" dirty="0">
+              <a:ln>
+                <a:noFill/>
+              </a:ln>
+              <a:solidFill>
+                <a:srgbClr val="282828"/>
+              </a:solidFill>
+              <a:effectLst/>
+              <a:latin typeface="Proxima Nova"/>
+            </a:endParaRPr>
+          </a:p>
+          <a:p>
+            <a:pPr marL="0" marR="0" lvl="0" indent="0" algn="l" defTabSz="914400" rtl="0" eaLnBrk="0" fontAlgn="base" latinLnBrk="0" hangingPunct="0">
+              <a:lnSpc>
+                <a:spcPct val="100000"/>
+              </a:lnSpc>
+              <a:spcBef>
+                <a:spcPct val="0"/>
+              </a:spcBef>
+              <a:spcAft>
+                <a:spcPct val="0"/>
+              </a:spcAft>
+              <a:buClrTx/>
+              <a:buSzTx/>
+              <a:buFontTx/>
+              <a:buNone/>
+              <a:tabLst/>
+            </a:pPr>
+            <a:r>
+              <a:rPr lang="en-US" altLang="en-US" sz="1200" dirty="0">
+                <a:solidFill>
+                  <a:srgbClr val="282828"/>
+                </a:solidFill>
+                <a:latin typeface="Proxima Nova"/>
+              </a:rPr>
+              <a:t>W</a:t>
+            </a:r>
+            <a:r>
+              <a:rPr kumimoji="0" lang="en-US" altLang="en-US" sz="1200" b="0" i="0" u="none" strike="noStrike" cap="none" normalizeH="0" baseline="0" dirty="0">
+                <a:ln>
+                  <a:noFill/>
+                </a:ln>
+                <a:solidFill>
+                  <a:srgbClr val="282828"/>
+                </a:solidFill>
+                <a:effectLst/>
+                <a:latin typeface="Proxima Nova"/>
+              </a:rPr>
+              <a:t>ork out the characteristic equation of the above model.  </a:t>
+            </a:r>
+            <a:endParaRPr kumimoji="0" lang="en-US" altLang="en-US" sz="600" b="0" i="0" u="none" strike="noStrike" cap="none" normalizeH="0" baseline="0" dirty="0">
+              <a:ln>
+                <a:noFill/>
+              </a:ln>
+              <a:solidFill>
+                <a:schemeClr val="tx1"/>
+              </a:solidFill>
+              <a:effectLst/>
+            </a:endParaRPr>
+          </a:p>
+          <a:p>
+            <a:pPr marL="0" marR="0" lvl="0" indent="0" algn="l" defTabSz="914400" rtl="0" eaLnBrk="0" fontAlgn="base" latinLnBrk="0" hangingPunct="0">
+              <a:lnSpc>
+                <a:spcPct val="100000"/>
+              </a:lnSpc>
+              <a:spcBef>
+                <a:spcPct val="0"/>
+              </a:spcBef>
+              <a:spcAft>
+                <a:spcPct val="0"/>
+              </a:spcAft>
+              <a:buClrTx/>
+              <a:buSzTx/>
+              <a:buFontTx/>
+              <a:buNone/>
+              <a:tabLst/>
+            </a:pPr>
+            <a:r>
+              <a:rPr kumimoji="0" lang="en-US" altLang="en-US" sz="1200" b="0" i="0" u="none" strike="noStrike" cap="none" normalizeH="0" baseline="0" dirty="0">
+                <a:ln>
+                  <a:noFill/>
+                </a:ln>
+                <a:solidFill>
+                  <a:srgbClr val="282828"/>
+                </a:solidFill>
+                <a:effectLst/>
+                <a:latin typeface="Proxima Nova"/>
+              </a:rPr>
+              <a:t>In addition, find the roots of this characteristic equation and make a judgment of the stationarity of the model.  </a:t>
+            </a:r>
+            <a:endParaRPr kumimoji="0" lang="en-US" altLang="en-US" sz="600" b="0" i="0" u="none" strike="noStrike" cap="none" normalizeH="0" baseline="0" dirty="0">
+              <a:ln>
+                <a:noFill/>
+              </a:ln>
+              <a:solidFill>
+                <a:schemeClr val="tx1"/>
+              </a:solidFill>
+              <a:effectLst/>
+            </a:endParaRPr>
+          </a:p>
+          <a:p>
+            <a:pPr marL="0" marR="0" lvl="0" indent="0" algn="l" defTabSz="914400" rtl="0" eaLnBrk="0" fontAlgn="base" latinLnBrk="0" hangingPunct="0">
+              <a:lnSpc>
+                <a:spcPct val="100000"/>
+              </a:lnSpc>
+              <a:spcBef>
+                <a:spcPct val="0"/>
+              </a:spcBef>
+              <a:spcAft>
+                <a:spcPct val="0"/>
+              </a:spcAft>
+              <a:buClrTx/>
+              <a:buSzTx/>
+              <a:buFontTx/>
+              <a:buNone/>
+              <a:tabLst/>
+            </a:pPr>
+            <a:r>
+              <a:rPr kumimoji="0" lang="en-US" altLang="en-US" sz="1200" b="0" i="0" u="none" strike="noStrike" cap="none" normalizeH="0" baseline="0" dirty="0">
+                <a:ln>
+                  <a:noFill/>
+                </a:ln>
+                <a:solidFill>
+                  <a:srgbClr val="282828"/>
+                </a:solidFill>
+                <a:effectLst/>
+                <a:latin typeface="Proxima Nova"/>
+              </a:rPr>
+              <a:t>Next, find the true system frequency of this model using the formula from these slides.  </a:t>
+            </a:r>
+            <a:endParaRPr kumimoji="0" lang="en-US" altLang="en-US" sz="600" b="0" i="0" u="none" strike="noStrike" cap="none" normalizeH="0" baseline="0" dirty="0">
+              <a:ln>
+                <a:noFill/>
+              </a:ln>
+              <a:solidFill>
+                <a:schemeClr val="tx1"/>
+              </a:solidFill>
+              <a:effectLst/>
+            </a:endParaRPr>
+          </a:p>
+          <a:p>
+            <a:pPr marL="0" marR="0" lvl="0" indent="0" algn="l" defTabSz="914400" rtl="0" eaLnBrk="0" fontAlgn="base" latinLnBrk="0" hangingPunct="0">
+              <a:lnSpc>
+                <a:spcPct val="100000"/>
+              </a:lnSpc>
+              <a:spcBef>
+                <a:spcPct val="0"/>
+              </a:spcBef>
+              <a:spcAft>
+                <a:spcPct val="0"/>
+              </a:spcAft>
+              <a:buClrTx/>
+              <a:buSzTx/>
+              <a:buFontTx/>
+              <a:buNone/>
+              <a:tabLst/>
+            </a:pPr>
+            <a:r>
+              <a:rPr kumimoji="0" lang="en-US" altLang="en-US" sz="1200" b="0" i="0" u="none" strike="noStrike" cap="none" normalizeH="0" baseline="0" dirty="0">
+                <a:ln>
+                  <a:noFill/>
+                </a:ln>
+                <a:solidFill>
+                  <a:srgbClr val="282828"/>
+                </a:solidFill>
+                <a:effectLst/>
+                <a:latin typeface="Proxima Nova"/>
+              </a:rPr>
+              <a:t>Finally, copy to your slide the true ACF and spectral density of this model.</a:t>
+            </a:r>
+            <a:endParaRPr kumimoji="0" lang="en-US" altLang="en-US" sz="2700" b="0" i="0" u="none" strike="noStrike" cap="none" normalizeH="0" baseline="0" dirty="0">
+              <a:ln>
+                <a:noFill/>
+              </a:ln>
+              <a:solidFill>
+                <a:srgbClr val="282828"/>
+              </a:solidFill>
+              <a:effectLst/>
+              <a:latin typeface="Proxima Nova"/>
+            </a:endParaRPr>
+          </a:p>
+        </p:txBody>
+      </p:sp>
+      <p:pic>
+        <p:nvPicPr>
+          <p:cNvPr id="1026" name="Picture 2" descr="https://2ds.datascience.smu.edu/content/files-api/files/1839b988-1850-4da5-980e-73fef5de7a03">
+            <a:extLst>
+              <a:ext uri="{FF2B5EF4-FFF2-40B4-BE49-F238E27FC236}">
+                <a16:creationId xmlns:a16="http://schemas.microsoft.com/office/drawing/2014/main" id="{1598877F-433A-45EA-9334-0330806345CF}"/>
+              </a:ext>
+            </a:extLst>
+          </p:cNvPr>
+          <p:cNvPicPr>
+            <a:picLocks noChangeAspect="1" noChangeArrowheads="1"/>
+          </p:cNvPicPr>
+          <p:nvPr/>
+        </p:nvPicPr>
+        <p:blipFill>
+          <a:blip r:embed="rId3">
+            <a:extLst>
+              <a:ext uri="{28A0092B-C50C-407E-A947-70E740481C1C}">
+                <a14:useLocalDpi xmlns:a14="http://schemas.microsoft.com/office/drawing/2010/main" val="0"/>
+              </a:ext>
+            </a:extLst>
+          </a:blip>
+          <a:srcRect/>
+          <a:stretch>
+            <a:fillRect/>
+          </a:stretch>
+        </p:blipFill>
+        <p:spPr bwMode="auto">
+          <a:xfrm>
+            <a:off x="4647630" y="304800"/>
+            <a:ext cx="2914650" cy="428625"/>
+          </a:xfrm>
+          <a:prstGeom prst="rect">
+            <a:avLst/>
+          </a:prstGeom>
+          <a:noFill/>
+          <a:extLst>
+            <a:ext uri="{909E8E84-426E-40DD-AFC4-6F175D3DCCD1}">
+              <a14:hiddenFill xmlns:a14="http://schemas.microsoft.com/office/drawing/2010/main">
+                <a:solidFill>
+                  <a:srgbClr val="FFFFFF"/>
+                </a:solidFill>
+              </a14:hiddenFill>
+            </a:ext>
+          </a:extLst>
+        </p:spPr>
+      </p:pic>
+      <p:sp>
+        <p:nvSpPr>
+          <p:cNvPr id="9" name="Rectangle 8">
+            <a:extLst>
+              <a:ext uri="{FF2B5EF4-FFF2-40B4-BE49-F238E27FC236}">
+                <a16:creationId xmlns:a16="http://schemas.microsoft.com/office/drawing/2014/main" id="{7CB4A87E-7391-45DC-9BB4-CF92D9F03CD2}"/>
               </a:ext>
             </a:extLst>
           </p:cNvPr>
@@ -2417,8 +3150,8 @@
         </p:nvSpPr>
         <p:spPr>
           <a:xfrm>
-            <a:off x="990600" y="914400"/>
-            <a:ext cx="2514600" cy="369332"/>
+            <a:off x="76200" y="4754940"/>
+            <a:ext cx="4114800" cy="1569660"/>
           </a:xfrm>
           <a:prstGeom prst="rect">
             <a:avLst/>
@@ -2431,18 +3164,94 @@
           <a:lstStyle/>
           <a:p>
             <a:r>
-              <a:rPr lang="en-US" dirty="0"/>
-              <a:t>5-Point Moving Average</a:t>
-            </a:r>
-          </a:p>
-        </p:txBody>
-      </p:sp>
-      <p:sp>
-        <p:nvSpPr>
-          <p:cNvPr id="6" name="Rectangle 5">
+              <a:rPr lang="en-US" sz="1200" dirty="0"/>
+              <a:t>library(</a:t>
+            </a:r>
+            <a:r>
+              <a:rPr lang="en-US" sz="1200" dirty="0" err="1"/>
+              <a:t>tswge</a:t>
+            </a:r>
+            <a:r>
+              <a:rPr lang="en-US" sz="1200" dirty="0"/>
+              <a:t>)</a:t>
+            </a:r>
+          </a:p>
+          <a:p>
+            <a:r>
+              <a:rPr lang="en-US" sz="1200" dirty="0"/>
+              <a:t># </a:t>
+            </a:r>
+            <a:r>
+              <a:rPr lang="en-US" sz="1200" dirty="0" err="1"/>
+              <a:t>X_t</a:t>
+            </a:r>
+            <a:r>
+              <a:rPr lang="en-US" sz="1200" dirty="0"/>
+              <a:t> + .5X_t-1 + .6X_t-2 = </a:t>
+            </a:r>
+            <a:r>
+              <a:rPr lang="en-US" sz="1200" dirty="0" err="1"/>
+              <a:t>a_t</a:t>
+            </a:r>
+            <a:endParaRPr lang="en-US" sz="1200" dirty="0"/>
+          </a:p>
+          <a:p>
+            <a:r>
+              <a:rPr lang="en-US" sz="1200" dirty="0"/>
+              <a:t>#Factor Table</a:t>
+            </a:r>
+          </a:p>
+          <a:p>
+            <a:r>
+              <a:rPr lang="en-US" sz="1200" dirty="0" err="1"/>
+              <a:t>factor.wge</a:t>
+            </a:r>
+            <a:r>
+              <a:rPr lang="en-US" sz="1200" dirty="0"/>
+              <a:t>(phi = c(-.5, -.6))</a:t>
+            </a:r>
+          </a:p>
+          <a:p>
+            <a:endParaRPr lang="en-US" sz="1200" dirty="0"/>
+          </a:p>
+          <a:p>
+            <a:r>
+              <a:rPr lang="en-US" sz="1200" dirty="0"/>
+              <a:t>#Plotting a </a:t>
+            </a:r>
+            <a:r>
+              <a:rPr lang="en-US" sz="1200" dirty="0" err="1"/>
+              <a:t>relization</a:t>
+            </a:r>
+            <a:r>
+              <a:rPr lang="en-US" sz="1200" dirty="0"/>
+              <a:t> along with true</a:t>
+            </a:r>
+          </a:p>
+          <a:p>
+            <a:r>
+              <a:rPr lang="en-US" sz="1200" dirty="0"/>
+              <a:t># autocorrelations and spectral density</a:t>
+            </a:r>
+          </a:p>
+          <a:p>
+            <a:r>
+              <a:rPr lang="en-US" sz="1200" dirty="0" err="1"/>
+              <a:t>plotts.true.wge</a:t>
+            </a:r>
+            <a:r>
+              <a:rPr lang="en-US" sz="1200" dirty="0"/>
+              <a:t>(phi = c(-.5, -.6))</a:t>
+            </a:r>
+          </a:p>
+        </p:txBody>
+      </p:sp>
+      <p:sp>
+        <p:nvSpPr>
+          <p:cNvPr id="12" name="Rectangle 11">
             <a:extLst>
               <a:ext uri="{FF2B5EF4-FFF2-40B4-BE49-F238E27FC236}">
-                <a16:creationId xmlns:a16="http://schemas.microsoft.com/office/drawing/2014/main" id="{49A68A6A-2615-4A44-A5A3-4B76376FFA12}"/>
+                <a16:creationId xmlns:a16="http://schemas.microsoft.com/office/drawing/2014/main" id="{1894E4B1-DAF5-44F7-AFA7-D1FBF203E0B9}"/>
               </a:ext>
             </a:extLst>
           </p:cNvPr>
@@ -2451,8 +3260,8 @@
         </p:nvSpPr>
         <p:spPr>
           <a:xfrm>
-            <a:off x="5410200" y="914400"/>
-            <a:ext cx="2514600" cy="369332"/>
+            <a:off x="3581400" y="5461337"/>
+            <a:ext cx="5257800" cy="1015663"/>
           </a:xfrm>
           <a:prstGeom prst="rect">
             <a:avLst/>
@@ -2465,18 +3274,47 @@
           <a:lstStyle/>
           <a:p>
             <a:r>
-              <a:rPr lang="en-US" dirty="0"/>
-              <a:t>51-Point moving average</a:t>
-            </a:r>
-          </a:p>
-        </p:txBody>
-      </p:sp>
-      <p:sp>
-        <p:nvSpPr>
-          <p:cNvPr id="2" name="Rectangle 1">
+              <a:rPr lang="en-US" sz="1200" dirty="0"/>
+              <a:t>Coefficients of Original polynomial:  </a:t>
+            </a:r>
+          </a:p>
+          <a:p>
+            <a:r>
+              <a:rPr lang="en-US" sz="1200" dirty="0"/>
+              <a:t>-0.5000 -0.6000 </a:t>
+            </a:r>
+          </a:p>
+          <a:p>
+            <a:endParaRPr lang="en-US" sz="1200" dirty="0"/>
+          </a:p>
+          <a:p>
+            <a:r>
+              <a:rPr lang="en-US" sz="1200" dirty="0"/>
+              <a:t>Factor                                 Roots                       Abs </a:t>
+            </a:r>
+            <a:r>
+              <a:rPr lang="en-US" sz="1200" dirty="0" err="1"/>
+              <a:t>Recip</a:t>
+            </a:r>
+            <a:r>
+              <a:rPr lang="en-US" sz="1200" dirty="0"/>
+              <a:t>    System Freq </a:t>
+            </a:r>
+          </a:p>
+          <a:p>
+            <a:r>
+              <a:rPr lang="en-US" sz="1200" dirty="0"/>
+              <a:t>1+0.5000B+0.6000B^2   -0.4167+-1.2219i    0.7746         0.3023</a:t>
+            </a:r>
+          </a:p>
+        </p:txBody>
+      </p:sp>
+      <p:sp>
+        <p:nvSpPr>
+          <p:cNvPr id="3" name="Rectangle 2">
             <a:extLst>
               <a:ext uri="{FF2B5EF4-FFF2-40B4-BE49-F238E27FC236}">
-                <a16:creationId xmlns:a16="http://schemas.microsoft.com/office/drawing/2014/main" id="{B3E2416F-2F42-42A2-A523-A863CB5FE4B3}"/>
+                <a16:creationId xmlns:a16="http://schemas.microsoft.com/office/drawing/2014/main" id="{C46DEA47-43E3-49EB-8A4A-DBA827BAB72C}"/>
               </a:ext>
             </a:extLst>
           </p:cNvPr>
@@ -2485,8 +3323,8 @@
         </p:nvSpPr>
         <p:spPr>
           <a:xfrm>
-            <a:off x="228600" y="5077361"/>
-            <a:ext cx="3505200" cy="1323439"/>
+            <a:off x="76200" y="1295400"/>
+            <a:ext cx="3048000" cy="523220"/>
           </a:xfrm>
           <a:prstGeom prst="rect">
             <a:avLst/>
@@ -2499,73 +3337,62 @@
           <a:lstStyle/>
           <a:p>
             <a:r>
-              <a:rPr lang="en-US" sz="1000" dirty="0"/>
-              <a:t>#Setup a 5 Point Moving Average Filter</a:t>
-            </a:r>
-          </a:p>
-          <a:p>
-            <a:r>
-              <a:rPr lang="en-US" sz="1000" dirty="0"/>
-              <a:t>ma5 = stats::filter(Stor8Item1_grouped$mean_sales,rep(1,5))/5</a:t>
-            </a:r>
-          </a:p>
-          <a:p>
-            <a:r>
-              <a:rPr lang="en-US" sz="1000" dirty="0"/>
-              <a:t>ma5 = </a:t>
-            </a:r>
-            <a:r>
-              <a:rPr lang="en-US" sz="1000" dirty="0" err="1"/>
-              <a:t>na.remove</a:t>
-            </a:r>
-            <a:r>
-              <a:rPr lang="en-US" sz="1000" dirty="0"/>
-              <a:t>(ma5)</a:t>
-            </a:r>
-          </a:p>
-          <a:p>
-            <a:endParaRPr lang="en-US" sz="1000" dirty="0"/>
-          </a:p>
-          <a:p>
-            <a:r>
-              <a:rPr lang="en-US" sz="1000" dirty="0"/>
-              <a:t>#Plot the Low Pass 5 Point Moving Average</a:t>
-            </a:r>
-          </a:p>
-          <a:p>
-            <a:r>
-              <a:rPr lang="en-US" sz="1000" dirty="0"/>
-              <a:t>plot(ma5,type = 'l')</a:t>
-            </a:r>
-          </a:p>
-          <a:p>
-            <a:r>
-              <a:rPr lang="en-US" sz="1000" dirty="0" err="1"/>
-              <a:t>parzen.wge</a:t>
-            </a:r>
-            <a:r>
-              <a:rPr lang="en-US" sz="1000" dirty="0"/>
-              <a:t>(ma5)</a:t>
-            </a:r>
-          </a:p>
-          <a:p>
-            <a:r>
-              <a:rPr lang="en-US" sz="1000" dirty="0" err="1"/>
-              <a:t>plotts.sample.wge</a:t>
-            </a:r>
-            <a:r>
-              <a:rPr lang="en-US" sz="1000" dirty="0"/>
-              <a:t>(ma5)</a:t>
-            </a:r>
-          </a:p>
-        </p:txBody>
-      </p:sp>
-      <p:sp>
-        <p:nvSpPr>
-          <p:cNvPr id="7" name="Rectangle 6">
+              <a:rPr lang="en-US" sz="1400" b="1" dirty="0"/>
+              <a:t>The Characteristic Equation</a:t>
+            </a:r>
+          </a:p>
+          <a:p>
+            <a:r>
+              <a:rPr lang="en-US" sz="1400" dirty="0"/>
+              <a:t>1 + .5z + .6z</a:t>
+            </a:r>
+            <a:r>
+              <a:rPr lang="en-US" sz="1400" baseline="30000" dirty="0"/>
+              <a:t>2 </a:t>
+            </a:r>
+            <a:r>
+              <a:rPr lang="en-US" sz="1400" dirty="0"/>
+              <a:t>= 0</a:t>
+            </a:r>
+          </a:p>
+        </p:txBody>
+      </p:sp>
+      <p:pic>
+        <p:nvPicPr>
+          <p:cNvPr id="6" name="Picture 5">
             <a:extLst>
               <a:ext uri="{FF2B5EF4-FFF2-40B4-BE49-F238E27FC236}">
-                <a16:creationId xmlns:a16="http://schemas.microsoft.com/office/drawing/2014/main" id="{155DE93D-3E7E-4B70-982A-7A8E46B9746A}"/>
+                <a16:creationId xmlns:a16="http://schemas.microsoft.com/office/drawing/2014/main" id="{3C1B4E4A-D4E9-4B75-92D1-7F960E1F8728}"/>
+              </a:ext>
+            </a:extLst>
+          </p:cNvPr>
+          <p:cNvPicPr>
+            <a:picLocks noChangeAspect="1"/>
+          </p:cNvPicPr>
+          <p:nvPr/>
+        </p:nvPicPr>
+        <p:blipFill>
+          <a:blip r:embed="rId4"/>
+          <a:stretch>
+            <a:fillRect/>
+          </a:stretch>
+        </p:blipFill>
+        <p:spPr>
+          <a:xfrm>
+            <a:off x="152402" y="2133600"/>
+            <a:ext cx="1714739" cy="733527"/>
+          </a:xfrm>
+          <a:prstGeom prst="rect">
+            <a:avLst/>
+          </a:prstGeom>
+        </p:spPr>
+      </p:pic>
+      <p:sp>
+        <p:nvSpPr>
+          <p:cNvPr id="10" name="Rectangle 9">
+            <a:extLst>
+              <a:ext uri="{FF2B5EF4-FFF2-40B4-BE49-F238E27FC236}">
+                <a16:creationId xmlns:a16="http://schemas.microsoft.com/office/drawing/2014/main" id="{B1422014-EAF4-4A11-84B0-4660660C6B35}"/>
               </a:ext>
             </a:extLst>
           </p:cNvPr>
@@ -2574,8 +3401,8 @@
         </p:nvSpPr>
         <p:spPr>
           <a:xfrm>
-            <a:off x="4572000" y="5077361"/>
-            <a:ext cx="3733800" cy="1323439"/>
+            <a:off x="2362200" y="1371600"/>
+            <a:ext cx="6821729" cy="338554"/>
           </a:xfrm>
           <a:prstGeom prst="rect">
             <a:avLst/>
@@ -2588,73 +3415,25 @@
           <a:lstStyle/>
           <a:p>
             <a:r>
-              <a:rPr lang="en-US" sz="1000" dirty="0"/>
-              <a:t>#Setup a 51 Point Moving Average Filter</a:t>
-            </a:r>
-          </a:p>
-          <a:p>
-            <a:r>
-              <a:rPr lang="en-US" sz="1000" dirty="0"/>
-              <a:t>ma51 = stats::filter(Stor8Item1_grouped$mean_sales,rep(1,51))/51</a:t>
-            </a:r>
-          </a:p>
-          <a:p>
-            <a:r>
-              <a:rPr lang="en-US" sz="1000" dirty="0"/>
-              <a:t>ma51 = </a:t>
-            </a:r>
-            <a:r>
-              <a:rPr lang="en-US" sz="1000" dirty="0" err="1"/>
-              <a:t>na.remove</a:t>
-            </a:r>
-            <a:r>
-              <a:rPr lang="en-US" sz="1000" dirty="0"/>
-              <a:t>(ma51)</a:t>
-            </a:r>
-          </a:p>
-          <a:p>
-            <a:endParaRPr lang="en-US" sz="1000" dirty="0"/>
-          </a:p>
-          <a:p>
-            <a:r>
-              <a:rPr lang="en-US" sz="1000" dirty="0"/>
-              <a:t>#Plot the Low Pass 51 Point Moving Average</a:t>
-            </a:r>
-          </a:p>
-          <a:p>
-            <a:r>
-              <a:rPr lang="en-US" sz="1000" dirty="0"/>
-              <a:t>plot(ma51,type = 'l')</a:t>
-            </a:r>
-          </a:p>
-          <a:p>
-            <a:r>
-              <a:rPr lang="en-US" sz="1000" dirty="0" err="1"/>
-              <a:t>parzen.wge</a:t>
-            </a:r>
-            <a:r>
-              <a:rPr lang="en-US" sz="1000" dirty="0"/>
-              <a:t>(ma51)</a:t>
-            </a:r>
-          </a:p>
-          <a:p>
-            <a:r>
-              <a:rPr lang="en-US" sz="1000" dirty="0" err="1"/>
-              <a:t>plotts.sample.wge</a:t>
-            </a:r>
-            <a:r>
-              <a:rPr lang="en-US" sz="1000" dirty="0"/>
-              <a:t>(ma51)</a:t>
-            </a:r>
-          </a:p>
-        </p:txBody>
-      </p:sp>
-      <p:sp>
-        <p:nvSpPr>
-          <p:cNvPr id="10" name="Rectangle 9">
+              <a:rPr lang="en-US" sz="1600" dirty="0">
+                <a:latin typeface="Arial" panose="020B0604020202020204" pitchFamily="34" charset="0"/>
+                <a:cs typeface="Arial" panose="020B0604020202020204" pitchFamily="34" charset="0"/>
+              </a:rPr>
+              <a:t>The absolute value of the reciprocal (.7746) </a:t>
+            </a:r>
+            <a:r>
+              <a:rPr lang="en-US" sz="1600" dirty="0"/>
+              <a:t>implies stationarity.</a:t>
+            </a:r>
+          </a:p>
+        </p:txBody>
+      </p:sp>
+      <p:sp>
+        <p:nvSpPr>
+          <p:cNvPr id="11" name="Rectangle 10">
             <a:extLst>
               <a:ext uri="{FF2B5EF4-FFF2-40B4-BE49-F238E27FC236}">
-                <a16:creationId xmlns:a16="http://schemas.microsoft.com/office/drawing/2014/main" id="{8BA76BFB-866F-45BA-BDF5-FFAA6E75D6C7}"/>
+                <a16:creationId xmlns:a16="http://schemas.microsoft.com/office/drawing/2014/main" id="{B9B04E58-1992-4E2A-96FB-342EC84AEBE2}"/>
               </a:ext>
             </a:extLst>
           </p:cNvPr>
@@ -2663,8 +3442,8 @@
         </p:nvSpPr>
         <p:spPr>
           <a:xfrm>
-            <a:off x="152399" y="3124200"/>
-            <a:ext cx="4126637" cy="1631216"/>
+            <a:off x="1828800" y="1619071"/>
+            <a:ext cx="7239000" cy="1200329"/>
           </a:xfrm>
           <a:prstGeom prst="rect">
             <a:avLst/>
@@ -2677,36 +3456,108 @@
           <a:lstStyle/>
           <a:p>
             <a:r>
-              <a:rPr lang="en-US" sz="1200" b="1" u="sng" dirty="0"/>
-              <a:t>Spectral Density of a 5-Point Moving Average:</a:t>
-            </a:r>
-          </a:p>
-          <a:p>
-            <a:r>
-              <a:rPr lang="en-US" sz="1100" dirty="0"/>
-              <a:t>There is still a peak in the spectral density at 0 which is evidence of some wandering behavior that is apparent in the realization.</a:t>
-            </a:r>
-          </a:p>
-          <a:p>
-            <a:r>
-              <a:rPr lang="en-US" sz="1100" dirty="0"/>
-              <a:t>There is also evidence of cyclic behavior in the realization which is supported both by our intuition and the spectral density. The peek around .083 which is indicative of a period at 1/.083 = 12, showing evidence of some monthly seasonality, is starting to fade. </a:t>
-            </a:r>
-          </a:p>
-          <a:p>
-            <a:r>
-              <a:rPr lang="en-US" sz="1100" dirty="0"/>
-              <a:t>The other two peak in the spectral density at .25 and .41 are also smoothing out.</a:t>
-            </a:r>
-          </a:p>
-        </p:txBody>
-      </p:sp>
-      <p:sp>
-        <p:nvSpPr>
-          <p:cNvPr id="11" name="Rectangle 10">
+              <a:rPr lang="en-US" sz="1600" b="1" dirty="0"/>
+              <a:t>The complex conjugate roots will be associated with:</a:t>
+            </a:r>
+          </a:p>
+          <a:p>
+            <a:pPr marL="285750" indent="-285750">
+              <a:buFont typeface="Arial" panose="020B0604020202020204" pitchFamily="34" charset="0"/>
+              <a:buChar char="•"/>
+            </a:pPr>
+            <a:r>
+              <a:rPr lang="en-US" sz="1400" dirty="0"/>
+              <a:t>Pseudo cyclic behavior in the realizations with frequency about f0 = .3023 (cycle length (1/.3023 = 3.3)</a:t>
+            </a:r>
+          </a:p>
+          <a:p>
+            <a:pPr marL="285750" indent="-285750">
+              <a:buFont typeface="Arial" panose="020B0604020202020204" pitchFamily="34" charset="0"/>
+              <a:buChar char="•"/>
+            </a:pPr>
+            <a:r>
+              <a:rPr lang="en-US" sz="1400" dirty="0"/>
+              <a:t>Damped sinusoidal autocorrelations with a period (cycle length) of about 3.3</a:t>
+            </a:r>
+          </a:p>
+          <a:p>
+            <a:pPr marL="285750" indent="-285750">
+              <a:buFont typeface="Arial" panose="020B0604020202020204" pitchFamily="34" charset="0"/>
+              <a:buChar char="•"/>
+            </a:pPr>
+            <a:r>
+              <a:rPr lang="en-US" sz="1400" dirty="0"/>
+              <a:t>A peak at about .3023 in the spectral density</a:t>
+            </a:r>
+          </a:p>
+        </p:txBody>
+      </p:sp>
+      <p:pic>
+        <p:nvPicPr>
+          <p:cNvPr id="14" name="Picture 13">
             <a:extLst>
               <a:ext uri="{FF2B5EF4-FFF2-40B4-BE49-F238E27FC236}">
-                <a16:creationId xmlns:a16="http://schemas.microsoft.com/office/drawing/2014/main" id="{48BC00FE-F797-4DC5-BD14-AE9101C67D4E}"/>
+                <a16:creationId xmlns:a16="http://schemas.microsoft.com/office/drawing/2014/main" id="{0795C5FC-7163-4B59-A421-786ABB43AE07}"/>
+              </a:ext>
+            </a:extLst>
+          </p:cNvPr>
+          <p:cNvPicPr>
+            <a:picLocks noChangeAspect="1"/>
+          </p:cNvPicPr>
+          <p:nvPr/>
+        </p:nvPicPr>
+        <p:blipFill>
+          <a:blip r:embed="rId5"/>
+          <a:stretch>
+            <a:fillRect/>
+          </a:stretch>
+        </p:blipFill>
+        <p:spPr>
+          <a:xfrm>
+            <a:off x="76200" y="2819400"/>
+            <a:ext cx="3866504" cy="2023521"/>
+          </a:xfrm>
+          <a:prstGeom prst="rect">
+            <a:avLst/>
+          </a:prstGeom>
+        </p:spPr>
+      </p:pic>
+      <p:pic>
+        <p:nvPicPr>
+          <p:cNvPr id="15" name="Picture 14">
+            <a:extLst>
+              <a:ext uri="{FF2B5EF4-FFF2-40B4-BE49-F238E27FC236}">
+                <a16:creationId xmlns:a16="http://schemas.microsoft.com/office/drawing/2014/main" id="{9A73D2DA-D796-413E-B4B2-5756BA38BC93}"/>
+              </a:ext>
+            </a:extLst>
+          </p:cNvPr>
+          <p:cNvPicPr>
+            <a:picLocks noChangeAspect="1"/>
+          </p:cNvPicPr>
+          <p:nvPr/>
+        </p:nvPicPr>
+        <p:blipFill>
+          <a:blip r:embed="rId6"/>
+          <a:stretch>
+            <a:fillRect/>
+          </a:stretch>
+        </p:blipFill>
+        <p:spPr>
+          <a:xfrm>
+            <a:off x="4343400" y="2765614"/>
+            <a:ext cx="4323704" cy="2263586"/>
+          </a:xfrm>
+          <a:prstGeom prst="rect">
+            <a:avLst/>
+          </a:prstGeom>
+        </p:spPr>
+      </p:pic>
+      <p:sp>
+        <p:nvSpPr>
+          <p:cNvPr id="16" name="Rectangle 15">
+            <a:extLst>
+              <a:ext uri="{FF2B5EF4-FFF2-40B4-BE49-F238E27FC236}">
+                <a16:creationId xmlns:a16="http://schemas.microsoft.com/office/drawing/2014/main" id="{130C98AE-2644-40A1-BBE5-928069C620BA}"/>
               </a:ext>
             </a:extLst>
           </p:cNvPr>
@@ -2715,8 +3566,8 @@
         </p:nvSpPr>
         <p:spPr>
           <a:xfrm>
-            <a:off x="4279036" y="3124200"/>
-            <a:ext cx="4126637" cy="1292662"/>
+            <a:off x="76199" y="1676400"/>
+            <a:ext cx="1790941" cy="523220"/>
           </a:xfrm>
           <a:prstGeom prst="rect">
             <a:avLst/>
@@ -2729,14 +3580,14 @@
           <a:lstStyle/>
           <a:p>
             <a:r>
-              <a:rPr lang="en-US" sz="1200" b="1" u="sng" dirty="0"/>
-              <a:t>Spectral Density of a 51-Point Moving Average:</a:t>
-            </a:r>
-          </a:p>
-          <a:p>
-            <a:r>
-              <a:rPr lang="en-US" sz="1100" dirty="0"/>
-              <a:t>With so much information being taken away with such a large smoothing number about the only information we can see here is there still seems to be some evidence of some wandering behavior with a peak in the spectral density at 0. There are small breaks at .2, .3 and .4 which could be seen more predominately in the 5-Point Moving Average.</a:t>
+              <a:rPr lang="en-US" sz="1400" b="1" dirty="0"/>
+              <a:t>Roots:</a:t>
+            </a:r>
+          </a:p>
+          <a:p>
+            <a:r>
+              <a:rPr lang="en-US" sz="1400" dirty="0"/>
+              <a:t>-0.4167+-1.2219i </a:t>
             </a:r>
           </a:p>
         </p:txBody>
@@ -2827,7 +3678,7 @@
         </p:nvSpPr>
         <p:spPr>
           <a:xfrm>
-            <a:off x="304800" y="4572000"/>
+            <a:off x="152400" y="4572000"/>
             <a:ext cx="8763000" cy="553998"/>
           </a:xfrm>
         </p:spPr>
@@ -2847,7 +3698,7 @@
                 <a:latin typeface="Arial" panose="020B0604020202020204" pitchFamily="34" charset="0"/>
                 <a:cs typeface="Arial" panose="020B0604020202020204" pitchFamily="34" charset="0"/>
               </a:rPr>
-              <a:t>How do you work out this from the videos? I got the Root correct but could not see how the inverse of the root worked.</a:t>
+              <a:t>Either I missed the math for the first part of this sinusoidal function or I just don’t know enough about Trig.</a:t>
             </a:r>
           </a:p>
         </p:txBody>
@@ -2902,7 +3753,7 @@
         <p:spPr>
           <a:xfrm>
             <a:off x="423540" y="5225086"/>
-            <a:ext cx="8648699" cy="923330"/>
+            <a:ext cx="8648699" cy="815608"/>
           </a:xfrm>
           <a:prstGeom prst="rect">
             <a:avLst/>
@@ -2915,19 +3766,50 @@
           <a:lstStyle/>
           <a:p>
             <a:r>
-              <a:rPr lang="en-US" b="1" i="1" dirty="0">
+              <a:rPr lang="en-US" sz="1400" b="1" dirty="0">
                 <a:latin typeface="Arial" panose="020B0604020202020204" pitchFamily="34" charset="0"/>
                 <a:cs typeface="Arial" panose="020B0604020202020204" pitchFamily="34" charset="0"/>
               </a:rPr>
-              <a:t>What is the inverse of the root: |r|–1? Please express your response to the nearest tenth. </a:t>
-            </a:r>
-            <a:r>
-              <a:rPr lang="en-US" dirty="0">
+              <a:t>Would you please breakdown the math behind this function?</a:t>
+            </a:r>
+          </a:p>
+          <a:p>
+            <a:r>
+              <a:rPr lang="en-US" sz="1100" dirty="0">
                 <a:latin typeface="Arial" panose="020B0604020202020204" pitchFamily="34" charset="0"/>
                 <a:cs typeface="Arial" panose="020B0604020202020204" pitchFamily="34" charset="0"/>
               </a:rPr>
-              <a:t>The answer is 1.2 so I am guessing r would have to be the AV of 2.2. I got a Z equal to -0.833 so ho do you work that back in to get r?</a:t>
-            </a:r>
+              <a:t>I am good with phi 1 and 2 and I know how to read the System Frequency output.</a:t>
+            </a:r>
+          </a:p>
+          <a:p>
+            <a:r>
+              <a:rPr lang="en-US" sz="1100" dirty="0">
+                <a:latin typeface="Arial" panose="020B0604020202020204" pitchFamily="34" charset="0"/>
+                <a:cs typeface="Arial" panose="020B0604020202020204" pitchFamily="34" charset="0"/>
+              </a:rPr>
+              <a:t>I even know the r code to produce the answer: </a:t>
+            </a:r>
+            <a:r>
+              <a:rPr lang="pt-BR" sz="1100" dirty="0">
+                <a:latin typeface="Arial" panose="020B0604020202020204" pitchFamily="34" charset="0"/>
+                <a:cs typeface="Arial" panose="020B0604020202020204" pitchFamily="34" charset="0"/>
+              </a:rPr>
+              <a:t>(1/(2*phi1))*acos(phi1/(2*sqrt(phi2)))</a:t>
+            </a:r>
+          </a:p>
+          <a:p>
+            <a:r>
+              <a:rPr lang="pt-BR" sz="1100" dirty="0">
+                <a:latin typeface="Arial" panose="020B0604020202020204" pitchFamily="34" charset="0"/>
+                <a:cs typeface="Arial" panose="020B0604020202020204" pitchFamily="34" charset="0"/>
+              </a:rPr>
+              <a:t>Maybe this is all I need but I was just woundering about the math in the formula.</a:t>
+            </a:r>
+            <a:endParaRPr lang="en-US" sz="1100" dirty="0">
+              <a:latin typeface="Arial" panose="020B0604020202020204" pitchFamily="34" charset="0"/>
+              <a:cs typeface="Arial" panose="020B0604020202020204" pitchFamily="34" charset="0"/>
+            </a:endParaRPr>
           </a:p>
         </p:txBody>
       </p:sp>
@@ -2945,8 +3827,8 @@
         </p:nvSpPr>
         <p:spPr>
           <a:xfrm>
-            <a:off x="380999" y="1751750"/>
-            <a:ext cx="8382000" cy="2585323"/>
+            <a:off x="304800" y="1610380"/>
+            <a:ext cx="8382000" cy="430887"/>
           </a:xfrm>
           <a:prstGeom prst="rect">
             <a:avLst/>
@@ -2958,88 +3840,21 @@
           </a:bodyPr>
           <a:lstStyle/>
           <a:p>
-            <a:pPr marR="730"/>
-            <a:r>
-              <a:rPr lang="en-US" b="1" i="1" dirty="0">
+            <a:pPr>
+              <a:spcBef>
+                <a:spcPts val="600"/>
+              </a:spcBef>
+              <a:defRPr/>
+            </a:pPr>
+            <a:r>
+              <a:rPr lang="en-US" sz="1100" dirty="0">
+                <a:solidFill>
+                  <a:prstClr val="black"/>
+                </a:solidFill>
                 <a:latin typeface="Arial" panose="020B0604020202020204" pitchFamily="34" charset="0"/>
-              </a:rPr>
-              <a:t>Realizations </a:t>
-            </a:r>
-            <a:r>
-              <a:rPr lang="en-US" dirty="0">
-                <a:latin typeface="Arial" panose="020B0604020202020204" pitchFamily="34" charset="0"/>
-              </a:rPr>
-              <a:t>are wandering or oscillating depending on whether the root of the characteristic equation is positive or negative, respectively.</a:t>
-            </a:r>
-          </a:p>
-          <a:p>
-            <a:endParaRPr lang="en-US" dirty="0">
-              <a:latin typeface="Arial" panose="020B0604020202020204" pitchFamily="34" charset="0"/>
-            </a:endParaRPr>
-          </a:p>
-          <a:p>
-            <a:pPr marR="730"/>
-            <a:r>
-              <a:rPr lang="en-US" b="1" i="1" dirty="0">
-                <a:latin typeface="Arial" panose="020B0604020202020204" pitchFamily="34" charset="0"/>
-              </a:rPr>
-              <a:t>Autocorrelations </a:t>
-            </a:r>
-            <a:r>
-              <a:rPr lang="en-US" dirty="0">
-                <a:latin typeface="Arial" panose="020B0604020202020204" pitchFamily="34" charset="0"/>
-              </a:rPr>
-              <a:t>are damped exponentials or damped oscillating exponentials depending on whether the root of the characteristic equation is positive or negative, respectively.</a:t>
-            </a:r>
-          </a:p>
-          <a:p>
-            <a:endParaRPr lang="en-US" dirty="0">
-              <a:latin typeface="Arial" panose="020B0604020202020204" pitchFamily="34" charset="0"/>
-            </a:endParaRPr>
-          </a:p>
-          <a:p>
-            <a:pPr marR="730"/>
-            <a:r>
-              <a:rPr lang="en-US" b="1" i="1" dirty="0">
-                <a:latin typeface="Arial" panose="020B0604020202020204" pitchFamily="34" charset="0"/>
-              </a:rPr>
-              <a:t>Spectral densities </a:t>
-            </a:r>
-            <a:r>
-              <a:rPr lang="en-US" dirty="0">
-                <a:latin typeface="Arial" panose="020B0604020202020204" pitchFamily="34" charset="0"/>
-              </a:rPr>
-              <a:t>have a peak at </a:t>
-            </a:r>
-            <a:r>
-              <a:rPr lang="en-US" i="1" dirty="0">
-                <a:latin typeface="Times New Roman" panose="02020603050405020304" pitchFamily="18" charset="0"/>
-              </a:rPr>
-              <a:t>f </a:t>
-            </a:r>
-            <a:r>
-              <a:rPr lang="en-US" dirty="0">
-                <a:latin typeface="Times New Roman" panose="02020603050405020304" pitchFamily="18" charset="0"/>
-              </a:rPr>
-              <a:t>= 0 or </a:t>
-            </a:r>
-            <a:r>
-              <a:rPr lang="en-US" i="1" dirty="0">
-                <a:latin typeface="Times New Roman" panose="02020603050405020304" pitchFamily="18" charset="0"/>
-              </a:rPr>
-              <a:t>f </a:t>
-            </a:r>
-            <a:r>
-              <a:rPr lang="en-US" dirty="0">
-                <a:latin typeface="Times New Roman" panose="02020603050405020304" pitchFamily="18" charset="0"/>
-              </a:rPr>
-              <a:t>=.5 </a:t>
-            </a:r>
-            <a:r>
-              <a:rPr lang="en-US" dirty="0">
-                <a:latin typeface="Arial" panose="020B0604020202020204" pitchFamily="34" charset="0"/>
-              </a:rPr>
-              <a:t>depending on whether the root of the characteristic equation is positive or negative, respectively.</a:t>
+                <a:cs typeface="Arial" panose="020B0604020202020204" pitchFamily="34" charset="0"/>
+              </a:rPr>
+              <a:t>An AR(2) and AR(p) model is stationary if and only if the roots of the characteristic equation are greater than 1 in absolute value (lie outside the unit circle).</a:t>
             </a:r>
           </a:p>
         </p:txBody>
@@ -3086,17 +3901,17 @@
           <a:p>
             <a:r>
               <a:rPr lang="en-US" sz="1800" kern="0" dirty="0"/>
-              <a:t>The last slide did a great job of recapping what this week 3 was about:</a:t>
-            </a:r>
-          </a:p>
-        </p:txBody>
-      </p:sp>
-      <p:sp>
-        <p:nvSpPr>
-          <p:cNvPr id="8" name="Rectangle 7">
+              <a:t>This week continued on with a breakdown of the AR(2) and AR(p) models.</a:t>
+            </a:r>
+          </a:p>
+        </p:txBody>
+      </p:sp>
+      <p:sp>
+        <p:nvSpPr>
+          <p:cNvPr id="10" name="Rectangle 9">
             <a:extLst>
               <a:ext uri="{FF2B5EF4-FFF2-40B4-BE49-F238E27FC236}">
-                <a16:creationId xmlns:a16="http://schemas.microsoft.com/office/drawing/2014/main" id="{D925AF1D-22C8-48B1-B16E-FC5FF5E2E242}"/>
+                <a16:creationId xmlns:a16="http://schemas.microsoft.com/office/drawing/2014/main" id="{D3696A6D-FC58-4F58-80D7-6495FCD51115}"/>
               </a:ext>
             </a:extLst>
           </p:cNvPr>
@@ -3105,8 +3920,8 @@
         </p:nvSpPr>
         <p:spPr>
           <a:xfrm>
-            <a:off x="3185465" y="1295400"/>
-            <a:ext cx="2773067" cy="400110"/>
+            <a:off x="304800" y="1297047"/>
+            <a:ext cx="1219373" cy="369332"/>
           </a:xfrm>
           <a:prstGeom prst="rect">
             <a:avLst/>
@@ -3119,12 +3934,1217 @@
           <a:lstStyle/>
           <a:p>
             <a:r>
-              <a:rPr lang="en-US" sz="2000" b="1" dirty="0"/>
-              <a:t>AR(1) Models: Summary</a:t>
-            </a:r>
-          </a:p>
-        </p:txBody>
-      </p:sp>
+              <a:rPr lang="en-US" b="1" dirty="0"/>
+              <a:t>Key results</a:t>
+            </a:r>
+          </a:p>
+        </p:txBody>
+      </p:sp>
+      <p:pic>
+        <p:nvPicPr>
+          <p:cNvPr id="12" name="Picture 11">
+            <a:extLst>
+              <a:ext uri="{FF2B5EF4-FFF2-40B4-BE49-F238E27FC236}">
+                <a16:creationId xmlns:a16="http://schemas.microsoft.com/office/drawing/2014/main" id="{274FFE4B-6A85-4546-9577-55F25F963786}"/>
+              </a:ext>
+            </a:extLst>
+          </p:cNvPr>
+          <p:cNvPicPr>
+            <a:picLocks noChangeAspect="1"/>
+          </p:cNvPicPr>
+          <p:nvPr/>
+        </p:nvPicPr>
+        <p:blipFill rotWithShape="1">
+          <a:blip r:embed="rId3"/>
+          <a:srcRect l="3707" t="6570" b="-1"/>
+          <a:stretch/>
+        </p:blipFill>
+        <p:spPr>
+          <a:xfrm>
+            <a:off x="565435" y="3102085"/>
+            <a:ext cx="4217347" cy="234223"/>
+          </a:xfrm>
+          <a:prstGeom prst="rect">
+            <a:avLst/>
+          </a:prstGeom>
+        </p:spPr>
+        <p:style>
+          <a:lnRef idx="2">
+            <a:schemeClr val="accent1"/>
+          </a:lnRef>
+          <a:fillRef idx="1">
+            <a:schemeClr val="lt1"/>
+          </a:fillRef>
+          <a:effectRef idx="0">
+            <a:schemeClr val="accent1"/>
+          </a:effectRef>
+          <a:fontRef idx="minor">
+            <a:schemeClr val="dk1"/>
+          </a:fontRef>
+        </p:style>
+      </p:pic>
+      <p:pic>
+        <p:nvPicPr>
+          <p:cNvPr id="13" name="Picture 12">
+            <a:extLst>
+              <a:ext uri="{FF2B5EF4-FFF2-40B4-BE49-F238E27FC236}">
+                <a16:creationId xmlns:a16="http://schemas.microsoft.com/office/drawing/2014/main" id="{8C1A2D5D-8EA3-4F22-9336-ECEF31EF7AA8}"/>
+              </a:ext>
+            </a:extLst>
+          </p:cNvPr>
+          <p:cNvPicPr>
+            <a:picLocks noChangeAspect="1"/>
+          </p:cNvPicPr>
+          <p:nvPr/>
+        </p:nvPicPr>
+        <p:blipFill rotWithShape="1">
+          <a:blip r:embed="rId4"/>
+          <a:srcRect l="4040"/>
+          <a:stretch/>
+        </p:blipFill>
+        <p:spPr>
+          <a:xfrm>
+            <a:off x="565435" y="2137469"/>
+            <a:ext cx="4038600" cy="834331"/>
+          </a:xfrm>
+          <a:prstGeom prst="rect">
+            <a:avLst/>
+          </a:prstGeom>
+        </p:spPr>
+        <p:style>
+          <a:lnRef idx="2">
+            <a:schemeClr val="accent1"/>
+          </a:lnRef>
+          <a:fillRef idx="1">
+            <a:schemeClr val="lt1"/>
+          </a:fillRef>
+          <a:effectRef idx="0">
+            <a:schemeClr val="accent1"/>
+          </a:effectRef>
+          <a:fontRef idx="minor">
+            <a:schemeClr val="dk1"/>
+          </a:fontRef>
+        </p:style>
+      </p:pic>
+      <p:sp>
+        <p:nvSpPr>
+          <p:cNvPr id="14" name="Rectangle 13">
+            <a:extLst>
+              <a:ext uri="{FF2B5EF4-FFF2-40B4-BE49-F238E27FC236}">
+                <a16:creationId xmlns:a16="http://schemas.microsoft.com/office/drawing/2014/main" id="{DEA8F5AA-2D30-48D7-9B40-7BA131C06DF9}"/>
+              </a:ext>
+            </a:extLst>
+          </p:cNvPr>
+          <p:cNvSpPr/>
+          <p:nvPr/>
+        </p:nvSpPr>
+        <p:spPr>
+          <a:xfrm>
+            <a:off x="4876800" y="1912891"/>
+            <a:ext cx="1810111" cy="261610"/>
+          </a:xfrm>
+          <a:prstGeom prst="rect">
+            <a:avLst/>
+          </a:prstGeom>
+        </p:spPr>
+        <p:txBody>
+          <a:bodyPr wrap="none">
+            <a:spAutoFit/>
+          </a:bodyPr>
+          <a:lstStyle/>
+          <a:p>
+            <a:r>
+              <a:rPr lang="en-US" sz="1100" dirty="0"/>
+              <a:t>Quadratic Formula Example:</a:t>
+            </a:r>
+          </a:p>
+        </p:txBody>
+      </p:sp>
+      <p:pic>
+        <p:nvPicPr>
+          <p:cNvPr id="15" name="Picture 14">
+            <a:extLst>
+              <a:ext uri="{FF2B5EF4-FFF2-40B4-BE49-F238E27FC236}">
+                <a16:creationId xmlns:a16="http://schemas.microsoft.com/office/drawing/2014/main" id="{0F4CCD29-011E-4F23-9EA2-4D8F424D8767}"/>
+              </a:ext>
+            </a:extLst>
+          </p:cNvPr>
+          <p:cNvPicPr>
+            <a:picLocks noChangeAspect="1"/>
+          </p:cNvPicPr>
+          <p:nvPr/>
+        </p:nvPicPr>
+        <p:blipFill>
+          <a:blip r:embed="rId5" cstate="print">
+            <a:extLst>
+              <a:ext uri="{28A0092B-C50C-407E-A947-70E740481C1C}">
+                <a14:useLocalDpi xmlns:a14="http://schemas.microsoft.com/office/drawing/2010/main" val="0"/>
+              </a:ext>
+            </a:extLst>
+          </a:blip>
+          <a:stretch>
+            <a:fillRect/>
+          </a:stretch>
+        </p:blipFill>
+        <p:spPr>
+          <a:xfrm>
+            <a:off x="4963800" y="2133600"/>
+            <a:ext cx="2322507" cy="381307"/>
+          </a:xfrm>
+          <a:prstGeom prst="rect">
+            <a:avLst/>
+          </a:prstGeom>
+        </p:spPr>
+      </p:pic>
+      <p:pic>
+        <p:nvPicPr>
+          <p:cNvPr id="16" name="Picture 15">
+            <a:extLst>
+              <a:ext uri="{FF2B5EF4-FFF2-40B4-BE49-F238E27FC236}">
+                <a16:creationId xmlns:a16="http://schemas.microsoft.com/office/drawing/2014/main" id="{1F992186-7DF7-4EAD-9346-0CE9BC7BFC6F}"/>
+              </a:ext>
+            </a:extLst>
+          </p:cNvPr>
+          <p:cNvPicPr>
+            <a:picLocks noChangeAspect="1"/>
+          </p:cNvPicPr>
+          <p:nvPr/>
+        </p:nvPicPr>
+        <p:blipFill>
+          <a:blip r:embed="rId6" cstate="print">
+            <a:extLst>
+              <a:ext uri="{28A0092B-C50C-407E-A947-70E740481C1C}">
+                <a14:useLocalDpi xmlns:a14="http://schemas.microsoft.com/office/drawing/2010/main" val="0"/>
+              </a:ext>
+            </a:extLst>
+          </a:blip>
+          <a:stretch>
+            <a:fillRect/>
+          </a:stretch>
+        </p:blipFill>
+        <p:spPr>
+          <a:xfrm>
+            <a:off x="4940873" y="2577838"/>
+            <a:ext cx="2667000" cy="393962"/>
+          </a:xfrm>
+          <a:prstGeom prst="rect">
+            <a:avLst/>
+          </a:prstGeom>
+        </p:spPr>
+      </p:pic>
+      <p:sp>
+        <p:nvSpPr>
+          <p:cNvPr id="17" name="TextBox 16">
+            <a:extLst>
+              <a:ext uri="{FF2B5EF4-FFF2-40B4-BE49-F238E27FC236}">
+                <a16:creationId xmlns:a16="http://schemas.microsoft.com/office/drawing/2014/main" id="{E1AB76EA-52D2-496E-B1DC-0A7DCDBA2C55}"/>
+              </a:ext>
+            </a:extLst>
+          </p:cNvPr>
+          <p:cNvSpPr txBox="1"/>
+          <p:nvPr/>
+        </p:nvSpPr>
+        <p:spPr bwMode="auto">
+          <a:xfrm>
+            <a:off x="4934222" y="3194777"/>
+            <a:ext cx="2362200" cy="234223"/>
+          </a:xfrm>
+          <a:prstGeom prst="rect">
+            <a:avLst/>
+          </a:prstGeom>
+          <a:noFill/>
+          <a:ln>
+            <a:noFill/>
+          </a:ln>
+          <a:extLst>
+            <a:ext uri="{909E8E84-426E-40DD-AFC4-6F175D3DCCD1}">
+              <a14:hiddenFill xmlns:a14="http://schemas.microsoft.com/office/drawing/2010/main">
+                <a:solidFill>
+                  <a:srgbClr val="FFFFFF"/>
+                </a:solidFill>
+              </a14:hiddenFill>
+            </a:ext>
+            <a:ext uri="{91240B29-F687-4F45-9708-019B960494DF}">
+              <a14:hiddenLine xmlns:a14="http://schemas.microsoft.com/office/drawing/2010/main" w="9525">
+                <a:solidFill>
+                  <a:srgbClr val="000000"/>
+                </a:solidFill>
+                <a:miter lim="800000"/>
+                <a:headEnd/>
+                <a:tailEnd/>
+              </a14:hiddenLine>
+            </a:ext>
+          </a:extLst>
+        </p:spPr>
+        <p:txBody>
+          <a:bodyPr wrap="square" rtlCol="0">
+            <a:noAutofit/>
+          </a:bodyPr>
+          <a:lstStyle/>
+          <a:p>
+            <a:pPr marL="0" marR="0" lvl="0" indent="0" algn="l" defTabSz="914400" rtl="0" eaLnBrk="1" fontAlgn="auto" latinLnBrk="0" hangingPunct="1">
+              <a:lnSpc>
+                <a:spcPct val="100000"/>
+              </a:lnSpc>
+              <a:spcBef>
+                <a:spcPts val="600"/>
+              </a:spcBef>
+              <a:spcAft>
+                <a:spcPts val="0"/>
+              </a:spcAft>
+              <a:buClrTx/>
+              <a:buSzTx/>
+              <a:buFontTx/>
+              <a:buNone/>
+              <a:tabLst/>
+              <a:defRPr/>
+            </a:pPr>
+            <a:r>
+              <a:rPr kumimoji="0" lang="en-US" sz="1000" b="0" i="0" u="none" strike="noStrike" kern="1200" cap="none" spc="0" normalizeH="0" baseline="0" noProof="0" dirty="0">
+                <a:ln>
+                  <a:noFill/>
+                </a:ln>
+                <a:solidFill>
+                  <a:prstClr val="black"/>
+                </a:solidFill>
+                <a:effectLst/>
+                <a:uLnTx/>
+                <a:uFillTx/>
+                <a:latin typeface="Arial" panose="020B0604020202020204" pitchFamily="34" charset="0"/>
+                <a:ea typeface="+mn-ea"/>
+                <a:cs typeface="Arial" panose="020B0604020202020204" pitchFamily="34" charset="0"/>
+                <a:sym typeface="Symbol" panose="05050102010706020507" pitchFamily="18" charset="2"/>
+              </a:rPr>
+              <a:t>Since </a:t>
+            </a:r>
+            <a:r>
+              <a:rPr kumimoji="0" lang="en-US" sz="1000" b="0" i="0" u="none" strike="noStrike" kern="1200" cap="none" spc="0" normalizeH="0" baseline="0" noProof="0" dirty="0">
+                <a:ln>
+                  <a:noFill/>
+                </a:ln>
+                <a:solidFill>
+                  <a:prstClr val="black"/>
+                </a:solidFill>
+                <a:effectLst/>
+                <a:uLnTx/>
+                <a:uFillTx/>
+                <a:latin typeface="Times New Roman" panose="02020603050405020304" pitchFamily="18" charset="0"/>
+                <a:ea typeface="+mn-ea"/>
+                <a:cs typeface="Times New Roman" panose="02020603050405020304" pitchFamily="18" charset="0"/>
+                <a:sym typeface="Symbol" panose="05050102010706020507" pitchFamily="18" charset="2"/>
+              </a:rPr>
+              <a:t>| </a:t>
+            </a:r>
+            <a:r>
+              <a:rPr kumimoji="0" lang="en-US" sz="1000" b="0" i="1" u="none" strike="noStrike" kern="1200" cap="none" spc="0" normalizeH="0" baseline="0" noProof="0" dirty="0">
+                <a:ln>
+                  <a:noFill/>
+                </a:ln>
+                <a:solidFill>
+                  <a:prstClr val="black"/>
+                </a:solidFill>
+                <a:effectLst/>
+                <a:uLnTx/>
+                <a:uFillTx/>
+                <a:latin typeface="Times New Roman" panose="02020603050405020304" pitchFamily="18" charset="0"/>
+                <a:ea typeface="+mn-ea"/>
+                <a:cs typeface="Times New Roman" panose="02020603050405020304" pitchFamily="18" charset="0"/>
+                <a:sym typeface="Symbol" panose="05050102010706020507" pitchFamily="18" charset="2"/>
+              </a:rPr>
+              <a:t>r </a:t>
+            </a:r>
+            <a:r>
+              <a:rPr kumimoji="0" lang="en-US" sz="1000" b="0" i="0" u="none" strike="noStrike" kern="1200" cap="none" spc="0" normalizeH="0" baseline="0" noProof="0" dirty="0">
+                <a:ln>
+                  <a:noFill/>
+                </a:ln>
+                <a:solidFill>
+                  <a:prstClr val="black"/>
+                </a:solidFill>
+                <a:effectLst/>
+                <a:uLnTx/>
+                <a:uFillTx/>
+                <a:latin typeface="Times New Roman" panose="02020603050405020304" pitchFamily="18" charset="0"/>
+                <a:ea typeface="+mn-ea"/>
+                <a:cs typeface="Times New Roman" panose="02020603050405020304" pitchFamily="18" charset="0"/>
+                <a:sym typeface="Symbol" panose="05050102010706020507" pitchFamily="18" charset="2"/>
+              </a:rPr>
+              <a:t>| &gt; 1 </a:t>
+            </a:r>
+            <a:r>
+              <a:rPr kumimoji="0" lang="en-US" sz="1000" b="0" i="0" u="none" strike="noStrike" kern="1200" cap="none" spc="0" normalizeH="0" baseline="0" noProof="0" dirty="0">
+                <a:ln>
+                  <a:noFill/>
+                </a:ln>
+                <a:solidFill>
+                  <a:prstClr val="black"/>
+                </a:solidFill>
+                <a:effectLst/>
+                <a:uLnTx/>
+                <a:uFillTx/>
+                <a:latin typeface="Arial" panose="020B0604020202020204" pitchFamily="34" charset="0"/>
+                <a:ea typeface="+mn-ea"/>
+                <a:cs typeface="Arial" panose="020B0604020202020204" pitchFamily="34" charset="0"/>
+                <a:sym typeface="Symbol" panose="05050102010706020507" pitchFamily="18" charset="2"/>
+              </a:rPr>
+              <a:t>the model </a:t>
+            </a:r>
+            <a:r>
+              <a:rPr kumimoji="0" lang="en-US" sz="1000" b="1" i="0" u="none" strike="noStrike" kern="1200" cap="none" spc="0" normalizeH="0" baseline="0" noProof="0" dirty="0">
+                <a:ln>
+                  <a:noFill/>
+                </a:ln>
+                <a:effectLst/>
+                <a:uLnTx/>
+                <a:uFillTx/>
+                <a:latin typeface="Arial" panose="020B0604020202020204" pitchFamily="34" charset="0"/>
+                <a:ea typeface="+mn-ea"/>
+                <a:cs typeface="Arial" panose="020B0604020202020204" pitchFamily="34" charset="0"/>
+                <a:sym typeface="Symbol" panose="05050102010706020507" pitchFamily="18" charset="2"/>
+              </a:rPr>
+              <a:t>is stationary</a:t>
+            </a:r>
+            <a:endParaRPr kumimoji="0" lang="en-US" sz="1000" b="1" i="0" u="none" strike="noStrike" kern="1200" cap="none" spc="0" normalizeH="0" baseline="0" noProof="0" dirty="0">
+              <a:ln>
+                <a:noFill/>
+              </a:ln>
+              <a:effectLst/>
+              <a:uLnTx/>
+              <a:uFillTx/>
+              <a:latin typeface="Arial" panose="020B0604020202020204" pitchFamily="34" charset="0"/>
+              <a:ea typeface="+mn-ea"/>
+              <a:cs typeface="Arial" panose="020B0604020202020204" pitchFamily="34" charset="0"/>
+            </a:endParaRPr>
+          </a:p>
+        </p:txBody>
+      </p:sp>
+      <p:pic>
+        <p:nvPicPr>
+          <p:cNvPr id="18" name="Picture 17">
+            <a:extLst>
+              <a:ext uri="{FF2B5EF4-FFF2-40B4-BE49-F238E27FC236}">
+                <a16:creationId xmlns:a16="http://schemas.microsoft.com/office/drawing/2014/main" id="{90EE32FA-B64A-4EBD-A3D6-6273308222F8}"/>
+              </a:ext>
+            </a:extLst>
+          </p:cNvPr>
+          <p:cNvPicPr>
+            <a:picLocks noChangeAspect="1"/>
+          </p:cNvPicPr>
+          <p:nvPr/>
+        </p:nvPicPr>
+        <p:blipFill>
+          <a:blip r:embed="rId7" cstate="print">
+            <a:extLst>
+              <a:ext uri="{28A0092B-C50C-407E-A947-70E740481C1C}">
+                <a14:useLocalDpi xmlns:a14="http://schemas.microsoft.com/office/drawing/2010/main" val="0"/>
+              </a:ext>
+            </a:extLst>
+          </a:blip>
+          <a:stretch>
+            <a:fillRect/>
+          </a:stretch>
+        </p:blipFill>
+        <p:spPr>
+          <a:xfrm>
+            <a:off x="4934222" y="2983264"/>
+            <a:ext cx="2057400" cy="230638"/>
+          </a:xfrm>
+          <a:prstGeom prst="rect">
+            <a:avLst/>
+          </a:prstGeom>
+        </p:spPr>
+      </p:pic>
+      <p:sp>
+        <p:nvSpPr>
+          <p:cNvPr id="19" name="Content Placeholder 5">
+            <a:extLst>
+              <a:ext uri="{FF2B5EF4-FFF2-40B4-BE49-F238E27FC236}">
+                <a16:creationId xmlns:a16="http://schemas.microsoft.com/office/drawing/2014/main" id="{A7B5B535-2FE4-4BF7-83B7-FB80EDA00B24}"/>
+              </a:ext>
+            </a:extLst>
+          </p:cNvPr>
+          <p:cNvSpPr txBox="1">
+            <a:spLocks/>
+          </p:cNvSpPr>
+          <p:nvPr/>
+        </p:nvSpPr>
+        <p:spPr>
+          <a:xfrm>
+            <a:off x="3157860" y="3490060"/>
+            <a:ext cx="5909940" cy="1005740"/>
+          </a:xfrm>
+          <a:prstGeom prst="rect">
+            <a:avLst/>
+          </a:prstGeom>
+        </p:spPr>
+        <p:txBody>
+          <a:bodyPr>
+            <a:noAutofit/>
+          </a:bodyPr>
+          <a:lstStyle>
+            <a:lvl1pPr marL="342900" indent="-342900" algn="l" defTabSz="914400" rtl="0" eaLnBrk="1" latinLnBrk="0" hangingPunct="1">
+              <a:spcBef>
+                <a:spcPts val="600"/>
+              </a:spcBef>
+              <a:buFont typeface="Arial" charset="0"/>
+              <a:buChar char="•"/>
+              <a:defRPr sz="3200" kern="1200">
+                <a:solidFill>
+                  <a:schemeClr val="tx1"/>
+                </a:solidFill>
+                <a:latin typeface="+mn-lt"/>
+                <a:ea typeface="+mn-ea"/>
+                <a:cs typeface="+mn-cs"/>
+              </a:defRPr>
+            </a:lvl1pPr>
+            <a:lvl2pPr marL="742950" indent="-285750" algn="l" defTabSz="914400" rtl="0" eaLnBrk="1" latinLnBrk="0" hangingPunct="1">
+              <a:spcBef>
+                <a:spcPts val="600"/>
+              </a:spcBef>
+              <a:buFont typeface="Arial" charset="0"/>
+              <a:buChar char="•"/>
+              <a:defRPr sz="2800" b="0" i="0" u="none" kern="1200">
+                <a:solidFill>
+                  <a:schemeClr val="tx1"/>
+                </a:solidFill>
+                <a:latin typeface="+mn-lt"/>
+                <a:ea typeface="+mn-ea"/>
+                <a:cs typeface="+mn-cs"/>
+              </a:defRPr>
+            </a:lvl2pPr>
+            <a:lvl3pPr marL="1143000" indent="-228600" algn="l" defTabSz="914400" rtl="0" eaLnBrk="1" latinLnBrk="0" hangingPunct="1">
+              <a:spcBef>
+                <a:spcPts val="600"/>
+              </a:spcBef>
+              <a:buFont typeface="Arial" charset="0"/>
+              <a:buChar char="•"/>
+              <a:defRPr sz="2400" kern="1200">
+                <a:solidFill>
+                  <a:schemeClr val="tx1"/>
+                </a:solidFill>
+                <a:latin typeface="+mn-lt"/>
+                <a:ea typeface="+mn-ea"/>
+                <a:cs typeface="+mn-cs"/>
+              </a:defRPr>
+            </a:lvl3pPr>
+            <a:lvl4pPr marL="1600200" indent="-228600" algn="l" defTabSz="914400" rtl="0" eaLnBrk="1" latinLnBrk="0" hangingPunct="1">
+              <a:spcBef>
+                <a:spcPts val="600"/>
+              </a:spcBef>
+              <a:buFont typeface="Arial" charset="0"/>
+              <a:buChar char="•"/>
+              <a:defRPr sz="2000" kern="1200">
+                <a:solidFill>
+                  <a:schemeClr val="tx1"/>
+                </a:solidFill>
+                <a:latin typeface="+mn-lt"/>
+                <a:ea typeface="+mn-ea"/>
+                <a:cs typeface="+mn-cs"/>
+              </a:defRPr>
+            </a:lvl4pPr>
+            <a:lvl5pPr marL="2057400" indent="-228600" algn="l" defTabSz="914400" rtl="0" eaLnBrk="1" latinLnBrk="0" hangingPunct="1">
+              <a:spcBef>
+                <a:spcPts val="600"/>
+              </a:spcBef>
+              <a:buFont typeface="Arial" charset="0"/>
+              <a:buChar char="•"/>
+              <a:defRPr sz="2000" kern="1200">
+                <a:solidFill>
+                  <a:schemeClr val="tx1"/>
+                </a:solidFill>
+                <a:latin typeface="+mn-lt"/>
+                <a:ea typeface="+mn-ea"/>
+                <a:cs typeface="+mn-cs"/>
+              </a:defRPr>
+            </a:lvl5pPr>
+            <a:lvl6pPr marL="2514600" indent="-228600" algn="l" defTabSz="914400" rtl="0" eaLnBrk="1" latinLnBrk="0" hangingPunct="1">
+              <a:spcBef>
+                <a:spcPct val="20000"/>
+              </a:spcBef>
+              <a:buFont typeface="Arial" panose="020B0604020202020204" pitchFamily="34" charset="0"/>
+              <a:buChar char="•"/>
+              <a:defRPr sz="2000" kern="1200">
+                <a:solidFill>
+                  <a:schemeClr val="tx1"/>
+                </a:solidFill>
+                <a:latin typeface="+mn-lt"/>
+                <a:ea typeface="+mn-ea"/>
+                <a:cs typeface="+mn-cs"/>
+              </a:defRPr>
+            </a:lvl6pPr>
+            <a:lvl7pPr marL="2971800" indent="-228600" algn="l" defTabSz="914400" rtl="0" eaLnBrk="1" latinLnBrk="0" hangingPunct="1">
+              <a:spcBef>
+                <a:spcPct val="20000"/>
+              </a:spcBef>
+              <a:buFont typeface="Arial" panose="020B0604020202020204" pitchFamily="34" charset="0"/>
+              <a:buChar char="•"/>
+              <a:defRPr sz="2000" kern="1200">
+                <a:solidFill>
+                  <a:schemeClr val="tx1"/>
+                </a:solidFill>
+                <a:latin typeface="+mn-lt"/>
+                <a:ea typeface="+mn-ea"/>
+                <a:cs typeface="+mn-cs"/>
+              </a:defRPr>
+            </a:lvl7pPr>
+            <a:lvl8pPr marL="3429000" indent="-228600" algn="l" defTabSz="914400" rtl="0" eaLnBrk="1" latinLnBrk="0" hangingPunct="1">
+              <a:spcBef>
+                <a:spcPct val="20000"/>
+              </a:spcBef>
+              <a:buFont typeface="Arial" panose="020B0604020202020204" pitchFamily="34" charset="0"/>
+              <a:buChar char="•"/>
+              <a:defRPr sz="2000" kern="1200">
+                <a:solidFill>
+                  <a:schemeClr val="tx1"/>
+                </a:solidFill>
+                <a:latin typeface="+mn-lt"/>
+                <a:ea typeface="+mn-ea"/>
+                <a:cs typeface="+mn-cs"/>
+              </a:defRPr>
+            </a:lvl8pPr>
+            <a:lvl9pPr marL="3886200" indent="-228600" algn="l" defTabSz="914400" rtl="0" eaLnBrk="1" latinLnBrk="0" hangingPunct="1">
+              <a:spcBef>
+                <a:spcPct val="20000"/>
+              </a:spcBef>
+              <a:buFont typeface="Arial" panose="020B0604020202020204" pitchFamily="34" charset="0"/>
+              <a:buChar char="•"/>
+              <a:defRPr sz="2000" kern="1200">
+                <a:solidFill>
+                  <a:schemeClr val="tx1"/>
+                </a:solidFill>
+                <a:latin typeface="+mn-lt"/>
+                <a:ea typeface="+mn-ea"/>
+                <a:cs typeface="+mn-cs"/>
+              </a:defRPr>
+            </a:lvl9pPr>
+          </a:lstStyle>
+          <a:p>
+            <a:pPr marL="0" indent="0">
+              <a:buFont typeface="Arial" charset="0"/>
+              <a:buNone/>
+            </a:pPr>
+            <a:r>
+              <a:rPr lang="en-US" sz="800" b="1" dirty="0">
+                <a:latin typeface="Arial" panose="020B0604020202020204" pitchFamily="34" charset="0"/>
+                <a:cs typeface="Arial" panose="020B0604020202020204" pitchFamily="34" charset="0"/>
+              </a:rPr>
+              <a:t>Summarizing: </a:t>
+            </a:r>
+            <a:r>
+              <a:rPr lang="en-US" sz="800" dirty="0">
+                <a:solidFill>
+                  <a:prstClr val="black"/>
+                </a:solidFill>
+                <a:latin typeface="Arial" panose="020B0604020202020204" pitchFamily="34" charset="0"/>
+                <a:cs typeface="Arial" panose="020B0604020202020204" pitchFamily="34" charset="0"/>
+              </a:rPr>
+              <a:t>A stationary AR(2) model, </a:t>
+            </a:r>
+            <a:br>
+              <a:rPr lang="en-US" sz="800" dirty="0">
+                <a:solidFill>
+                  <a:prstClr val="black"/>
+                </a:solidFill>
+                <a:latin typeface="Arial" panose="020B0604020202020204" pitchFamily="34" charset="0"/>
+                <a:cs typeface="Arial" panose="020B0604020202020204" pitchFamily="34" charset="0"/>
+              </a:rPr>
+            </a:br>
+            <a:r>
+              <a:rPr lang="en-US" sz="800" dirty="0">
+                <a:solidFill>
+                  <a:prstClr val="black"/>
+                </a:solidFill>
+                <a:latin typeface="Arial" panose="020B0604020202020204" pitchFamily="34" charset="0"/>
+                <a:cs typeface="Arial" panose="020B0604020202020204" pitchFamily="34" charset="0"/>
+              </a:rPr>
+              <a:t>(</a:t>
+            </a:r>
+            <a:r>
+              <a:rPr lang="en-US" sz="800" dirty="0">
+                <a:solidFill>
+                  <a:prstClr val="black"/>
+                </a:solidFill>
+                <a:latin typeface="Symbol" panose="05050102010706020507" pitchFamily="18" charset="2"/>
+                <a:cs typeface="Arial" panose="020B0604020202020204" pitchFamily="34" charset="0"/>
+              </a:rPr>
+              <a:t>1 - </a:t>
+            </a:r>
+            <a:r>
+              <a:rPr lang="en-US" sz="800" i="1" dirty="0">
+                <a:solidFill>
+                  <a:prstClr val="black"/>
+                </a:solidFill>
+                <a:latin typeface="Symbol" panose="05050102010706020507" pitchFamily="18" charset="2"/>
+                <a:cs typeface="Arial" panose="020B0604020202020204" pitchFamily="34" charset="0"/>
+              </a:rPr>
+              <a:t>j</a:t>
+            </a:r>
+            <a:r>
+              <a:rPr lang="en-US" sz="800" baseline="-25000" dirty="0">
+                <a:solidFill>
+                  <a:prstClr val="black"/>
+                </a:solidFill>
+                <a:latin typeface="Symbol" panose="05050102010706020507" pitchFamily="18" charset="2"/>
+                <a:cs typeface="Arial" panose="020B0604020202020204" pitchFamily="34" charset="0"/>
+              </a:rPr>
+              <a:t>1</a:t>
+            </a:r>
+            <a:r>
+              <a:rPr lang="en-US" sz="800" i="1" dirty="0">
+                <a:solidFill>
+                  <a:prstClr val="black"/>
+                </a:solidFill>
+                <a:latin typeface="Symbol" panose="05050102010706020507" pitchFamily="18" charset="2"/>
+                <a:cs typeface="Arial" panose="020B0604020202020204" pitchFamily="34" charset="0"/>
+              </a:rPr>
+              <a:t>B </a:t>
+            </a:r>
+            <a:r>
+              <a:rPr lang="en-US" sz="800" dirty="0">
+                <a:solidFill>
+                  <a:prstClr val="black"/>
+                </a:solidFill>
+                <a:latin typeface="Symbol" panose="05050102010706020507" pitchFamily="18" charset="2"/>
+                <a:cs typeface="Arial" panose="020B0604020202020204" pitchFamily="34" charset="0"/>
+              </a:rPr>
+              <a:t>- </a:t>
+            </a:r>
+            <a:r>
+              <a:rPr lang="en-US" sz="800" i="1" dirty="0">
+                <a:solidFill>
+                  <a:prstClr val="black"/>
+                </a:solidFill>
+                <a:latin typeface="Symbol" panose="05050102010706020507" pitchFamily="18" charset="2"/>
+                <a:cs typeface="Arial" panose="020B0604020202020204" pitchFamily="34" charset="0"/>
+              </a:rPr>
+              <a:t>j</a:t>
+            </a:r>
+            <a:r>
+              <a:rPr lang="en-US" sz="800" baseline="-25000" dirty="0">
+                <a:solidFill>
+                  <a:prstClr val="black"/>
+                </a:solidFill>
+                <a:latin typeface="Symbol" panose="05050102010706020507" pitchFamily="18" charset="2"/>
+                <a:cs typeface="Arial" panose="020B0604020202020204" pitchFamily="34" charset="0"/>
+              </a:rPr>
+              <a:t>1</a:t>
+            </a:r>
+            <a:r>
+              <a:rPr lang="en-US" sz="800" i="1" dirty="0">
+                <a:solidFill>
+                  <a:prstClr val="black"/>
+                </a:solidFill>
+                <a:latin typeface="Symbol" panose="05050102010706020507" pitchFamily="18" charset="2"/>
+                <a:cs typeface="Arial" panose="020B0604020202020204" pitchFamily="34" charset="0"/>
+              </a:rPr>
+              <a:t>B </a:t>
+            </a:r>
+            <a:r>
+              <a:rPr lang="en-US" sz="800" baseline="30000" dirty="0">
+                <a:solidFill>
+                  <a:prstClr val="black"/>
+                </a:solidFill>
+                <a:latin typeface="Symbol" panose="05050102010706020507" pitchFamily="18" charset="2"/>
+                <a:cs typeface="Arial" panose="020B0604020202020204" pitchFamily="34" charset="0"/>
+              </a:rPr>
+              <a:t>2</a:t>
+            </a:r>
+            <a:r>
+              <a:rPr lang="en-US" sz="800" dirty="0">
+                <a:solidFill>
+                  <a:prstClr val="black"/>
+                </a:solidFill>
+                <a:latin typeface="Times New Roman" panose="02020603050405020304" pitchFamily="18" charset="0"/>
+                <a:cs typeface="Times New Roman" panose="02020603050405020304" pitchFamily="18" charset="0"/>
+              </a:rPr>
+              <a:t>)X</a:t>
+            </a:r>
+            <a:r>
+              <a:rPr lang="en-US" sz="800" i="1" baseline="-25000" dirty="0">
+                <a:solidFill>
+                  <a:prstClr val="black"/>
+                </a:solidFill>
+                <a:latin typeface="Times New Roman" panose="02020603050405020304" pitchFamily="18" charset="0"/>
+                <a:cs typeface="Times New Roman" panose="02020603050405020304" pitchFamily="18" charset="0"/>
+              </a:rPr>
+              <a:t>t</a:t>
+            </a:r>
+            <a:r>
+              <a:rPr lang="en-US" sz="800" dirty="0">
+                <a:solidFill>
+                  <a:prstClr val="black"/>
+                </a:solidFill>
+                <a:latin typeface="Symbol" panose="05050102010706020507" pitchFamily="18" charset="2"/>
+                <a:cs typeface="Arial" panose="020B0604020202020204" pitchFamily="34" charset="0"/>
+              </a:rPr>
+              <a:t> = </a:t>
+            </a:r>
+            <a:r>
+              <a:rPr lang="en-US" sz="800" i="1" dirty="0">
+                <a:solidFill>
+                  <a:prstClr val="black"/>
+                </a:solidFill>
+                <a:latin typeface="Times New Roman" panose="02020603050405020304" pitchFamily="18" charset="0"/>
+                <a:cs typeface="Times New Roman" panose="02020603050405020304" pitchFamily="18" charset="0"/>
+              </a:rPr>
+              <a:t>a</a:t>
+            </a:r>
+            <a:r>
+              <a:rPr lang="en-US" sz="800" i="1" baseline="-25000" dirty="0">
+                <a:solidFill>
+                  <a:prstClr val="black"/>
+                </a:solidFill>
+                <a:latin typeface="Times New Roman" panose="02020603050405020304" pitchFamily="18" charset="0"/>
+                <a:cs typeface="Times New Roman" panose="02020603050405020304" pitchFamily="18" charset="0"/>
+              </a:rPr>
+              <a:t>t</a:t>
+            </a:r>
+            <a:r>
+              <a:rPr lang="en-US" sz="800" dirty="0">
+                <a:solidFill>
+                  <a:prstClr val="black"/>
+                </a:solidFill>
+                <a:latin typeface="Symbol" panose="05050102010706020507" pitchFamily="18" charset="2"/>
+                <a:cs typeface="Arial" panose="020B0604020202020204" pitchFamily="34" charset="0"/>
+              </a:rPr>
+              <a:t>, </a:t>
+            </a:r>
+            <a:r>
+              <a:rPr lang="en-US" sz="800" dirty="0">
+                <a:solidFill>
+                  <a:prstClr val="black"/>
+                </a:solidFill>
+                <a:latin typeface="Arial" panose="020B0604020202020204" pitchFamily="34" charset="0"/>
+                <a:cs typeface="Arial" panose="020B0604020202020204" pitchFamily="34" charset="0"/>
+              </a:rPr>
+              <a:t>whose characteristic equation has complex conjugate roots</a:t>
+            </a:r>
+            <a:endParaRPr lang="en-US" sz="800" b="1" dirty="0">
+              <a:solidFill>
+                <a:srgbClr val="0000FF"/>
+              </a:solidFill>
+              <a:latin typeface="Arial" panose="020B0604020202020204" pitchFamily="34" charset="0"/>
+              <a:cs typeface="Arial" panose="020B0604020202020204" pitchFamily="34" charset="0"/>
+            </a:endParaRPr>
+          </a:p>
+          <a:p>
+            <a:pPr>
+              <a:defRPr/>
+            </a:pPr>
+            <a:r>
+              <a:rPr lang="en-US" sz="800" dirty="0">
+                <a:solidFill>
+                  <a:prstClr val="black"/>
+                </a:solidFill>
+                <a:latin typeface="Arial" panose="020B0604020202020204" pitchFamily="34" charset="0"/>
+                <a:cs typeface="Arial" panose="020B0604020202020204" pitchFamily="34" charset="0"/>
+              </a:rPr>
+              <a:t>Has realizations that show a </a:t>
+            </a:r>
+            <a:r>
+              <a:rPr lang="en-US" sz="800" i="1" dirty="0">
+                <a:latin typeface="Arial" panose="020B0604020202020204" pitchFamily="34" charset="0"/>
+                <a:cs typeface="Arial" panose="020B0604020202020204" pitchFamily="34" charset="0"/>
+              </a:rPr>
+              <a:t>pseudo-cyclic behavior </a:t>
+            </a:r>
+            <a:r>
+              <a:rPr lang="en-US" sz="800" dirty="0">
+                <a:latin typeface="Arial" panose="020B0604020202020204" pitchFamily="34" charset="0"/>
+                <a:cs typeface="Arial" panose="020B0604020202020204" pitchFamily="34" charset="0"/>
+              </a:rPr>
+              <a:t>w</a:t>
+            </a:r>
+            <a:r>
+              <a:rPr lang="en-US" sz="800" dirty="0">
+                <a:solidFill>
+                  <a:prstClr val="black"/>
+                </a:solidFill>
+                <a:latin typeface="Arial" panose="020B0604020202020204" pitchFamily="34" charset="0"/>
+                <a:cs typeface="Arial" panose="020B0604020202020204" pitchFamily="34" charset="0"/>
+              </a:rPr>
+              <a:t>ith cycle length about </a:t>
+            </a:r>
+            <a:r>
+              <a:rPr lang="en-US" sz="800" dirty="0">
+                <a:solidFill>
+                  <a:prstClr val="black"/>
+                </a:solidFill>
+                <a:latin typeface="Times New Roman" panose="02020603050405020304" pitchFamily="18" charset="0"/>
+                <a:cs typeface="Times New Roman" panose="02020603050405020304" pitchFamily="18" charset="0"/>
+              </a:rPr>
+              <a:t>1/</a:t>
+            </a:r>
+            <a:r>
+              <a:rPr lang="en-US" sz="800" i="1" dirty="0">
+                <a:solidFill>
+                  <a:prstClr val="black"/>
+                </a:solidFill>
+                <a:latin typeface="Times New Roman" panose="02020603050405020304" pitchFamily="18" charset="0"/>
+                <a:cs typeface="Times New Roman" panose="02020603050405020304" pitchFamily="18" charset="0"/>
+              </a:rPr>
+              <a:t>f</a:t>
+            </a:r>
+            <a:r>
+              <a:rPr lang="en-US" sz="800" baseline="-25000" dirty="0">
+                <a:solidFill>
+                  <a:prstClr val="black"/>
+                </a:solidFill>
+                <a:latin typeface="Times New Roman" panose="02020603050405020304" pitchFamily="18" charset="0"/>
+                <a:cs typeface="Times New Roman" panose="02020603050405020304" pitchFamily="18" charset="0"/>
+              </a:rPr>
+              <a:t>0</a:t>
+            </a:r>
+            <a:r>
+              <a:rPr lang="en-US" sz="800" dirty="0">
+                <a:solidFill>
+                  <a:prstClr val="black"/>
+                </a:solidFill>
+                <a:latin typeface="Arial" panose="020B0604020202020204" pitchFamily="34" charset="0"/>
+                <a:cs typeface="Arial" panose="020B0604020202020204" pitchFamily="34" charset="0"/>
+              </a:rPr>
+              <a:t>, where </a:t>
+            </a:r>
+            <a:r>
+              <a:rPr lang="en-US" sz="800" i="1" dirty="0">
+                <a:solidFill>
+                  <a:prstClr val="black"/>
+                </a:solidFill>
+                <a:latin typeface="Times New Roman" panose="02020603050405020304" pitchFamily="18" charset="0"/>
+                <a:cs typeface="Times New Roman" panose="02020603050405020304" pitchFamily="18" charset="0"/>
+              </a:rPr>
+              <a:t>f</a:t>
+            </a:r>
+            <a:r>
+              <a:rPr lang="en-US" sz="800" baseline="-25000" dirty="0">
+                <a:solidFill>
+                  <a:prstClr val="black"/>
+                </a:solidFill>
+                <a:latin typeface="Times New Roman" panose="02020603050405020304" pitchFamily="18" charset="0"/>
+                <a:cs typeface="Times New Roman" panose="02020603050405020304" pitchFamily="18" charset="0"/>
+              </a:rPr>
+              <a:t>0</a:t>
+            </a:r>
+            <a:r>
+              <a:rPr lang="en-US" sz="800" dirty="0">
+                <a:solidFill>
+                  <a:prstClr val="black"/>
+                </a:solidFill>
+                <a:latin typeface="Arial" panose="020B0604020202020204" pitchFamily="34" charset="0"/>
+                <a:cs typeface="Arial" panose="020B0604020202020204" pitchFamily="34" charset="0"/>
+              </a:rPr>
+              <a:t> is given on previous slides</a:t>
+            </a:r>
+          </a:p>
+          <a:p>
+            <a:pPr>
+              <a:defRPr/>
+            </a:pPr>
+            <a:r>
+              <a:rPr lang="en-US" sz="800" dirty="0">
+                <a:solidFill>
+                  <a:prstClr val="black"/>
+                </a:solidFill>
+                <a:latin typeface="Arial" panose="020B0604020202020204" pitchFamily="34" charset="0"/>
+                <a:cs typeface="Arial" panose="020B0604020202020204" pitchFamily="34" charset="0"/>
+              </a:rPr>
+              <a:t>The autocorrelation function has the appearance of a </a:t>
+            </a:r>
+            <a:r>
+              <a:rPr lang="en-US" sz="800" i="1" dirty="0">
+                <a:latin typeface="Arial" panose="020B0604020202020204" pitchFamily="34" charset="0"/>
+                <a:cs typeface="Arial" panose="020B0604020202020204" pitchFamily="34" charset="0"/>
+              </a:rPr>
+              <a:t>damped sinusoidal </a:t>
+            </a:r>
+            <a:r>
+              <a:rPr lang="en-US" sz="800" dirty="0">
+                <a:latin typeface="Arial" panose="020B0604020202020204" pitchFamily="34" charset="0"/>
+                <a:cs typeface="Arial" panose="020B0604020202020204" pitchFamily="34" charset="0"/>
+              </a:rPr>
+              <a:t>with frequency </a:t>
+            </a:r>
+            <a:r>
+              <a:rPr lang="en-US" sz="800" i="1" dirty="0">
+                <a:solidFill>
+                  <a:prstClr val="black"/>
+                </a:solidFill>
+                <a:latin typeface="Times New Roman" panose="02020603050405020304" pitchFamily="18" charset="0"/>
+                <a:cs typeface="Times New Roman" panose="02020603050405020304" pitchFamily="18" charset="0"/>
+              </a:rPr>
+              <a:t>f</a:t>
+            </a:r>
+            <a:r>
+              <a:rPr lang="en-US" sz="800" baseline="-25000" dirty="0">
+                <a:solidFill>
+                  <a:prstClr val="black"/>
+                </a:solidFill>
+                <a:latin typeface="Times New Roman" panose="02020603050405020304" pitchFamily="18" charset="0"/>
+                <a:cs typeface="Times New Roman" panose="02020603050405020304" pitchFamily="18" charset="0"/>
+              </a:rPr>
+              <a:t>0</a:t>
+            </a:r>
+            <a:r>
+              <a:rPr lang="en-US" sz="800" dirty="0">
+                <a:solidFill>
+                  <a:prstClr val="black"/>
+                </a:solidFill>
+                <a:latin typeface="Arial" panose="020B0604020202020204" pitchFamily="34" charset="0"/>
+                <a:cs typeface="Arial" panose="020B0604020202020204" pitchFamily="34" charset="0"/>
+              </a:rPr>
+              <a:t> (i.e., cycle length </a:t>
+            </a:r>
+            <a:r>
+              <a:rPr lang="en-US" sz="800" dirty="0">
+                <a:solidFill>
+                  <a:prstClr val="black"/>
+                </a:solidFill>
+                <a:latin typeface="Times New Roman" panose="02020603050405020304" pitchFamily="18" charset="0"/>
+                <a:cs typeface="Times New Roman" panose="02020603050405020304" pitchFamily="18" charset="0"/>
+              </a:rPr>
+              <a:t>1/</a:t>
+            </a:r>
+            <a:r>
+              <a:rPr lang="en-US" sz="800" i="1" dirty="0">
+                <a:solidFill>
+                  <a:prstClr val="black"/>
+                </a:solidFill>
+                <a:latin typeface="Times New Roman" panose="02020603050405020304" pitchFamily="18" charset="0"/>
+                <a:cs typeface="Times New Roman" panose="02020603050405020304" pitchFamily="18" charset="0"/>
+              </a:rPr>
+              <a:t>f</a:t>
+            </a:r>
+            <a:r>
+              <a:rPr lang="en-US" sz="800" baseline="-25000" dirty="0">
+                <a:solidFill>
+                  <a:prstClr val="black"/>
+                </a:solidFill>
+                <a:latin typeface="Times New Roman" panose="02020603050405020304" pitchFamily="18" charset="0"/>
+                <a:cs typeface="Times New Roman" panose="02020603050405020304" pitchFamily="18" charset="0"/>
+              </a:rPr>
+              <a:t>0 </a:t>
+            </a:r>
+            <a:r>
+              <a:rPr lang="en-US" sz="800" dirty="0">
+                <a:solidFill>
+                  <a:prstClr val="black"/>
+                </a:solidFill>
+                <a:latin typeface="Arial" panose="020B0604020202020204" pitchFamily="34" charset="0"/>
+                <a:cs typeface="Arial" panose="020B0604020202020204" pitchFamily="34" charset="0"/>
+              </a:rPr>
+              <a:t>)</a:t>
+            </a:r>
+          </a:p>
+          <a:p>
+            <a:pPr>
+              <a:defRPr/>
+            </a:pPr>
+            <a:r>
+              <a:rPr lang="en-US" sz="800" dirty="0">
+                <a:solidFill>
+                  <a:prstClr val="black"/>
+                </a:solidFill>
+                <a:latin typeface="Arial" panose="020B0604020202020204" pitchFamily="34" charset="0"/>
+                <a:cs typeface="Arial" panose="020B0604020202020204" pitchFamily="34" charset="0"/>
+              </a:rPr>
+              <a:t>The spectral density has a </a:t>
+            </a:r>
+            <a:r>
+              <a:rPr lang="en-US" sz="800" i="1" dirty="0">
+                <a:latin typeface="Arial" panose="020B0604020202020204" pitchFamily="34" charset="0"/>
+                <a:cs typeface="Arial" panose="020B0604020202020204" pitchFamily="34" charset="0"/>
+              </a:rPr>
+              <a:t>peak at about </a:t>
+            </a:r>
+            <a:r>
+              <a:rPr lang="en-US" sz="800" i="1" dirty="0">
+                <a:latin typeface="Times New Roman" panose="02020603050405020304" pitchFamily="18" charset="0"/>
+                <a:cs typeface="Times New Roman" panose="02020603050405020304" pitchFamily="18" charset="0"/>
+              </a:rPr>
+              <a:t>f</a:t>
+            </a:r>
+            <a:r>
+              <a:rPr lang="en-US" sz="800" baseline="-25000" dirty="0">
+                <a:latin typeface="Times New Roman" panose="02020603050405020304" pitchFamily="18" charset="0"/>
+                <a:cs typeface="Times New Roman" panose="02020603050405020304" pitchFamily="18" charset="0"/>
+              </a:rPr>
+              <a:t>0</a:t>
+            </a:r>
+            <a:endParaRPr lang="en-US" sz="800" dirty="0">
+              <a:latin typeface="Arial" panose="020B0604020202020204" pitchFamily="34" charset="0"/>
+              <a:cs typeface="Arial" panose="020B0604020202020204" pitchFamily="34" charset="0"/>
+            </a:endParaRPr>
+          </a:p>
+        </p:txBody>
+      </p:sp>
+      <p:pic>
+        <p:nvPicPr>
+          <p:cNvPr id="21" name="Picture 20">
+            <a:extLst>
+              <a:ext uri="{FF2B5EF4-FFF2-40B4-BE49-F238E27FC236}">
+                <a16:creationId xmlns:a16="http://schemas.microsoft.com/office/drawing/2014/main" id="{92F7B381-7B54-4642-B325-095CEB36839E}"/>
+              </a:ext>
+            </a:extLst>
+          </p:cNvPr>
+          <p:cNvPicPr>
+            <a:picLocks noChangeAspect="1"/>
+          </p:cNvPicPr>
+          <p:nvPr/>
+        </p:nvPicPr>
+        <p:blipFill>
+          <a:blip r:embed="rId8" cstate="print">
+            <a:extLst>
+              <a:ext uri="{28A0092B-C50C-407E-A947-70E740481C1C}">
+                <a14:useLocalDpi xmlns:a14="http://schemas.microsoft.com/office/drawing/2010/main" val="0"/>
+              </a:ext>
+            </a:extLst>
+          </a:blip>
+          <a:stretch>
+            <a:fillRect/>
+          </a:stretch>
+        </p:blipFill>
+        <p:spPr>
+          <a:xfrm>
+            <a:off x="5715000" y="6080251"/>
+            <a:ext cx="3054994" cy="472949"/>
+          </a:xfrm>
+          <a:prstGeom prst="rect">
+            <a:avLst/>
+          </a:prstGeom>
+        </p:spPr>
+      </p:pic>
+      <p:sp>
+        <p:nvSpPr>
+          <p:cNvPr id="22" name="Rectangle 21">
+            <a:extLst>
+              <a:ext uri="{FF2B5EF4-FFF2-40B4-BE49-F238E27FC236}">
+                <a16:creationId xmlns:a16="http://schemas.microsoft.com/office/drawing/2014/main" id="{1A279719-1D5A-4125-B626-2CD7DA14F261}"/>
+              </a:ext>
+            </a:extLst>
+          </p:cNvPr>
+          <p:cNvSpPr/>
+          <p:nvPr/>
+        </p:nvSpPr>
+        <p:spPr>
+          <a:xfrm>
+            <a:off x="3048000" y="6096000"/>
+            <a:ext cx="2597186" cy="276999"/>
+          </a:xfrm>
+          <a:prstGeom prst="rect">
+            <a:avLst/>
+          </a:prstGeom>
+        </p:spPr>
+        <p:txBody>
+          <a:bodyPr wrap="none">
+            <a:spAutoFit/>
+          </a:bodyPr>
+          <a:lstStyle/>
+          <a:p>
+            <a:r>
+              <a:rPr lang="pt-BR" sz="1200" dirty="0">
+                <a:latin typeface="Arial" panose="020B0604020202020204" pitchFamily="34" charset="0"/>
+                <a:cs typeface="Arial" panose="020B0604020202020204" pitchFamily="34" charset="0"/>
+              </a:rPr>
+              <a:t>(1/(2*phi1))*acos(1.38/(2*sqrt(.75)))</a:t>
+            </a:r>
+            <a:endParaRPr lang="en-US" sz="1200" dirty="0"/>
+          </a:p>
+        </p:txBody>
+      </p:sp>
+      <p:sp>
+        <p:nvSpPr>
+          <p:cNvPr id="23" name="Rectangle 22">
+            <a:extLst>
+              <a:ext uri="{FF2B5EF4-FFF2-40B4-BE49-F238E27FC236}">
+                <a16:creationId xmlns:a16="http://schemas.microsoft.com/office/drawing/2014/main" id="{2B30CEC2-486E-4C8B-8951-6F083C967C35}"/>
+              </a:ext>
+            </a:extLst>
+          </p:cNvPr>
+          <p:cNvSpPr/>
+          <p:nvPr/>
+        </p:nvSpPr>
+        <p:spPr>
+          <a:xfrm>
+            <a:off x="4495800" y="6324600"/>
+            <a:ext cx="1058303" cy="276999"/>
+          </a:xfrm>
+          <a:prstGeom prst="rect">
+            <a:avLst/>
+          </a:prstGeom>
+        </p:spPr>
+        <p:txBody>
+          <a:bodyPr wrap="none">
+            <a:spAutoFit/>
+          </a:bodyPr>
+          <a:lstStyle/>
+          <a:p>
+            <a:r>
+              <a:rPr lang="en-US" sz="1200" dirty="0"/>
+              <a:t>[1] 0.1032771</a:t>
+            </a:r>
+          </a:p>
+        </p:txBody>
+      </p:sp>
+      <p:pic>
+        <p:nvPicPr>
+          <p:cNvPr id="24" name="Picture 23">
+            <a:extLst>
+              <a:ext uri="{FF2B5EF4-FFF2-40B4-BE49-F238E27FC236}">
+                <a16:creationId xmlns:a16="http://schemas.microsoft.com/office/drawing/2014/main" id="{27D84041-4D2C-4DDC-9321-0CA77B596872}"/>
+              </a:ext>
+            </a:extLst>
+          </p:cNvPr>
+          <p:cNvPicPr>
+            <a:picLocks noChangeAspect="1"/>
+          </p:cNvPicPr>
+          <p:nvPr/>
+        </p:nvPicPr>
+        <p:blipFill>
+          <a:blip r:embed="rId9"/>
+          <a:stretch>
+            <a:fillRect/>
+          </a:stretch>
+        </p:blipFill>
+        <p:spPr>
+          <a:xfrm>
+            <a:off x="549925" y="3425644"/>
+            <a:ext cx="2569621" cy="407326"/>
+          </a:xfrm>
+          <a:prstGeom prst="rect">
+            <a:avLst/>
+          </a:prstGeom>
+        </p:spPr>
+      </p:pic>
+      <p:pic>
+        <p:nvPicPr>
+          <p:cNvPr id="25" name="Picture 24">
+            <a:extLst>
+              <a:ext uri="{FF2B5EF4-FFF2-40B4-BE49-F238E27FC236}">
+                <a16:creationId xmlns:a16="http://schemas.microsoft.com/office/drawing/2014/main" id="{89ECFFAB-C91C-4D49-AF4D-45DB67026B16}"/>
+              </a:ext>
+            </a:extLst>
+          </p:cNvPr>
+          <p:cNvPicPr>
+            <a:picLocks noChangeAspect="1"/>
+          </p:cNvPicPr>
+          <p:nvPr/>
+        </p:nvPicPr>
+        <p:blipFill>
+          <a:blip r:embed="rId10"/>
+          <a:stretch>
+            <a:fillRect/>
+          </a:stretch>
+        </p:blipFill>
+        <p:spPr>
+          <a:xfrm>
+            <a:off x="5867400" y="5029200"/>
+            <a:ext cx="2462798" cy="911093"/>
+          </a:xfrm>
+          <a:prstGeom prst="rect">
+            <a:avLst/>
+          </a:prstGeom>
+        </p:spPr>
+      </p:pic>
     </p:spTree>
     <p:extLst>
       <p:ext uri="{BB962C8B-B14F-4D97-AF65-F5344CB8AC3E}">
@@ -3135,6 +5155,548 @@
   <p:clrMapOvr>
     <a:masterClrMapping/>
   </p:clrMapOvr>
+  <p:timing>
+    <p:tnLst>
+      <p:par>
+        <p:cTn id="1" dur="indefinite" restart="never" nodeType="tmRoot">
+          <p:childTnLst>
+            <p:seq concurrent="1" nextAc="seek">
+              <p:cTn id="2" dur="indefinite" nodeType="mainSeq">
+                <p:childTnLst>
+                  <p:par>
+                    <p:cTn id="3" fill="hold">
+                      <p:stCondLst>
+                        <p:cond delay="indefinite"/>
+                      </p:stCondLst>
+                      <p:childTnLst>
+                        <p:par>
+                          <p:cTn id="4" fill="hold">
+                            <p:stCondLst>
+                              <p:cond delay="0"/>
+                            </p:stCondLst>
+                            <p:childTnLst>
+                              <p:par>
+                                <p:cTn id="5" presetID="10" presetClass="entr" presetSubtype="0" fill="hold" nodeType="clickEffect">
+                                  <p:stCondLst>
+                                    <p:cond delay="0"/>
+                                  </p:stCondLst>
+                                  <p:childTnLst>
+                                    <p:set>
+                                      <p:cBhvr>
+                                        <p:cTn id="6" dur="1" fill="hold">
+                                          <p:stCondLst>
+                                            <p:cond delay="0"/>
+                                          </p:stCondLst>
+                                        </p:cTn>
+                                        <p:tgtEl>
+                                          <p:spTgt spid="15"/>
+                                        </p:tgtEl>
+                                        <p:attrNameLst>
+                                          <p:attrName>style.visibility</p:attrName>
+                                        </p:attrNameLst>
+                                      </p:cBhvr>
+                                      <p:to>
+                                        <p:strVal val="visible"/>
+                                      </p:to>
+                                    </p:set>
+                                    <p:animEffect transition="in" filter="fade">
+                                      <p:cBhvr>
+                                        <p:cTn id="7" dur="500"/>
+                                        <p:tgtEl>
+                                          <p:spTgt spid="15"/>
+                                        </p:tgtEl>
+                                      </p:cBhvr>
+                                    </p:animEffect>
+                                  </p:childTnLst>
+                                </p:cTn>
+                              </p:par>
+                            </p:childTnLst>
+                          </p:cTn>
+                        </p:par>
+                      </p:childTnLst>
+                    </p:cTn>
+                  </p:par>
+                  <p:par>
+                    <p:cTn id="8" fill="hold">
+                      <p:stCondLst>
+                        <p:cond delay="indefinite"/>
+                      </p:stCondLst>
+                      <p:childTnLst>
+                        <p:par>
+                          <p:cTn id="9" fill="hold">
+                            <p:stCondLst>
+                              <p:cond delay="0"/>
+                            </p:stCondLst>
+                            <p:childTnLst>
+                              <p:par>
+                                <p:cTn id="10" presetID="10" presetClass="entr" presetSubtype="0" fill="hold" nodeType="clickEffect">
+                                  <p:stCondLst>
+                                    <p:cond delay="0"/>
+                                  </p:stCondLst>
+                                  <p:childTnLst>
+                                    <p:set>
+                                      <p:cBhvr>
+                                        <p:cTn id="11" dur="1" fill="hold">
+                                          <p:stCondLst>
+                                            <p:cond delay="0"/>
+                                          </p:stCondLst>
+                                        </p:cTn>
+                                        <p:tgtEl>
+                                          <p:spTgt spid="16"/>
+                                        </p:tgtEl>
+                                        <p:attrNameLst>
+                                          <p:attrName>style.visibility</p:attrName>
+                                        </p:attrNameLst>
+                                      </p:cBhvr>
+                                      <p:to>
+                                        <p:strVal val="visible"/>
+                                      </p:to>
+                                    </p:set>
+                                    <p:animEffect transition="in" filter="fade">
+                                      <p:cBhvr>
+                                        <p:cTn id="12" dur="500"/>
+                                        <p:tgtEl>
+                                          <p:spTgt spid="16"/>
+                                        </p:tgtEl>
+                                      </p:cBhvr>
+                                    </p:animEffect>
+                                  </p:childTnLst>
+                                </p:cTn>
+                              </p:par>
+                            </p:childTnLst>
+                          </p:cTn>
+                        </p:par>
+                      </p:childTnLst>
+                    </p:cTn>
+                  </p:par>
+                  <p:par>
+                    <p:cTn id="13" fill="hold">
+                      <p:stCondLst>
+                        <p:cond delay="indefinite"/>
+                      </p:stCondLst>
+                      <p:childTnLst>
+                        <p:par>
+                          <p:cTn id="14" fill="hold">
+                            <p:stCondLst>
+                              <p:cond delay="0"/>
+                            </p:stCondLst>
+                            <p:childTnLst>
+                              <p:par>
+                                <p:cTn id="15" presetID="10" presetClass="entr" presetSubtype="0" fill="hold" nodeType="clickEffect">
+                                  <p:stCondLst>
+                                    <p:cond delay="0"/>
+                                  </p:stCondLst>
+                                  <p:childTnLst>
+                                    <p:set>
+                                      <p:cBhvr>
+                                        <p:cTn id="16" dur="1" fill="hold">
+                                          <p:stCondLst>
+                                            <p:cond delay="0"/>
+                                          </p:stCondLst>
+                                        </p:cTn>
+                                        <p:tgtEl>
+                                          <p:spTgt spid="18"/>
+                                        </p:tgtEl>
+                                        <p:attrNameLst>
+                                          <p:attrName>style.visibility</p:attrName>
+                                        </p:attrNameLst>
+                                      </p:cBhvr>
+                                      <p:to>
+                                        <p:strVal val="visible"/>
+                                      </p:to>
+                                    </p:set>
+                                    <p:animEffect transition="in" filter="fade">
+                                      <p:cBhvr>
+                                        <p:cTn id="17" dur="500"/>
+                                        <p:tgtEl>
+                                          <p:spTgt spid="18"/>
+                                        </p:tgtEl>
+                                      </p:cBhvr>
+                                    </p:animEffect>
+                                  </p:childTnLst>
+                                </p:cTn>
+                              </p:par>
+                            </p:childTnLst>
+                          </p:cTn>
+                        </p:par>
+                      </p:childTnLst>
+                    </p:cTn>
+                  </p:par>
+                  <p:par>
+                    <p:cTn id="18" fill="hold">
+                      <p:stCondLst>
+                        <p:cond delay="indefinite"/>
+                      </p:stCondLst>
+                      <p:childTnLst>
+                        <p:par>
+                          <p:cTn id="19" fill="hold">
+                            <p:stCondLst>
+                              <p:cond delay="0"/>
+                            </p:stCondLst>
+                            <p:childTnLst>
+                              <p:par>
+                                <p:cTn id="20" presetID="10" presetClass="entr" presetSubtype="0" fill="hold" grpId="0" nodeType="clickEffect">
+                                  <p:stCondLst>
+                                    <p:cond delay="0"/>
+                                  </p:stCondLst>
+                                  <p:childTnLst>
+                                    <p:set>
+                                      <p:cBhvr>
+                                        <p:cTn id="21" dur="1" fill="hold">
+                                          <p:stCondLst>
+                                            <p:cond delay="0"/>
+                                          </p:stCondLst>
+                                        </p:cTn>
+                                        <p:tgtEl>
+                                          <p:spTgt spid="17"/>
+                                        </p:tgtEl>
+                                        <p:attrNameLst>
+                                          <p:attrName>style.visibility</p:attrName>
+                                        </p:attrNameLst>
+                                      </p:cBhvr>
+                                      <p:to>
+                                        <p:strVal val="visible"/>
+                                      </p:to>
+                                    </p:set>
+                                    <p:animEffect transition="in" filter="fade">
+                                      <p:cBhvr>
+                                        <p:cTn id="22" dur="500"/>
+                                        <p:tgtEl>
+                                          <p:spTgt spid="17"/>
+                                        </p:tgtEl>
+                                      </p:cBhvr>
+                                    </p:animEffect>
+                                  </p:childTnLst>
+                                </p:cTn>
+                              </p:par>
+                            </p:childTnLst>
+                          </p:cTn>
+                        </p:par>
+                      </p:childTnLst>
+                    </p:cTn>
+                  </p:par>
+                  <p:par>
+                    <p:cTn id="23" fill="hold">
+                      <p:stCondLst>
+                        <p:cond delay="indefinite"/>
+                      </p:stCondLst>
+                      <p:childTnLst>
+                        <p:par>
+                          <p:cTn id="24" fill="hold">
+                            <p:stCondLst>
+                              <p:cond delay="0"/>
+                            </p:stCondLst>
+                            <p:childTnLst>
+                              <p:par>
+                                <p:cTn id="25" presetID="10" presetClass="entr" presetSubtype="0" fill="hold" nodeType="clickEffect">
+                                  <p:stCondLst>
+                                    <p:cond delay="0"/>
+                                  </p:stCondLst>
+                                  <p:childTnLst>
+                                    <p:set>
+                                      <p:cBhvr>
+                                        <p:cTn id="26" dur="1" fill="hold">
+                                          <p:stCondLst>
+                                            <p:cond delay="0"/>
+                                          </p:stCondLst>
+                                        </p:cTn>
+                                        <p:tgtEl>
+                                          <p:spTgt spid="19">
+                                            <p:txEl>
+                                              <p:pRg st="0" end="0"/>
+                                            </p:txEl>
+                                          </p:spTgt>
+                                        </p:tgtEl>
+                                        <p:attrNameLst>
+                                          <p:attrName>style.visibility</p:attrName>
+                                        </p:attrNameLst>
+                                      </p:cBhvr>
+                                      <p:to>
+                                        <p:strVal val="visible"/>
+                                      </p:to>
+                                    </p:set>
+                                    <p:animEffect transition="in" filter="fade">
+                                      <p:cBhvr>
+                                        <p:cTn id="27" dur="500"/>
+                                        <p:tgtEl>
+                                          <p:spTgt spid="19">
+                                            <p:txEl>
+                                              <p:pRg st="0" end="0"/>
+                                            </p:txEl>
+                                          </p:spTgt>
+                                        </p:tgtEl>
+                                      </p:cBhvr>
+                                    </p:animEffect>
+                                  </p:childTnLst>
+                                </p:cTn>
+                              </p:par>
+                            </p:childTnLst>
+                          </p:cTn>
+                        </p:par>
+                      </p:childTnLst>
+                    </p:cTn>
+                  </p:par>
+                  <p:par>
+                    <p:cTn id="28" fill="hold">
+                      <p:stCondLst>
+                        <p:cond delay="indefinite"/>
+                      </p:stCondLst>
+                      <p:childTnLst>
+                        <p:par>
+                          <p:cTn id="29" fill="hold">
+                            <p:stCondLst>
+                              <p:cond delay="0"/>
+                            </p:stCondLst>
+                            <p:childTnLst>
+                              <p:par>
+                                <p:cTn id="30" presetID="10" presetClass="entr" presetSubtype="0" fill="hold" nodeType="clickEffect">
+                                  <p:stCondLst>
+                                    <p:cond delay="0"/>
+                                  </p:stCondLst>
+                                  <p:childTnLst>
+                                    <p:set>
+                                      <p:cBhvr>
+                                        <p:cTn id="31" dur="1" fill="hold">
+                                          <p:stCondLst>
+                                            <p:cond delay="0"/>
+                                          </p:stCondLst>
+                                        </p:cTn>
+                                        <p:tgtEl>
+                                          <p:spTgt spid="19">
+                                            <p:txEl>
+                                              <p:pRg st="1" end="1"/>
+                                            </p:txEl>
+                                          </p:spTgt>
+                                        </p:tgtEl>
+                                        <p:attrNameLst>
+                                          <p:attrName>style.visibility</p:attrName>
+                                        </p:attrNameLst>
+                                      </p:cBhvr>
+                                      <p:to>
+                                        <p:strVal val="visible"/>
+                                      </p:to>
+                                    </p:set>
+                                    <p:animEffect transition="in" filter="fade">
+                                      <p:cBhvr>
+                                        <p:cTn id="32" dur="500"/>
+                                        <p:tgtEl>
+                                          <p:spTgt spid="19">
+                                            <p:txEl>
+                                              <p:pRg st="1" end="1"/>
+                                            </p:txEl>
+                                          </p:spTgt>
+                                        </p:tgtEl>
+                                      </p:cBhvr>
+                                    </p:animEffect>
+                                  </p:childTnLst>
+                                </p:cTn>
+                              </p:par>
+                            </p:childTnLst>
+                          </p:cTn>
+                        </p:par>
+                      </p:childTnLst>
+                    </p:cTn>
+                  </p:par>
+                  <p:par>
+                    <p:cTn id="33" fill="hold">
+                      <p:stCondLst>
+                        <p:cond delay="indefinite"/>
+                      </p:stCondLst>
+                      <p:childTnLst>
+                        <p:par>
+                          <p:cTn id="34" fill="hold">
+                            <p:stCondLst>
+                              <p:cond delay="0"/>
+                            </p:stCondLst>
+                            <p:childTnLst>
+                              <p:par>
+                                <p:cTn id="35" presetID="10" presetClass="entr" presetSubtype="0" fill="hold" nodeType="clickEffect">
+                                  <p:stCondLst>
+                                    <p:cond delay="0"/>
+                                  </p:stCondLst>
+                                  <p:childTnLst>
+                                    <p:set>
+                                      <p:cBhvr>
+                                        <p:cTn id="36" dur="1" fill="hold">
+                                          <p:stCondLst>
+                                            <p:cond delay="0"/>
+                                          </p:stCondLst>
+                                        </p:cTn>
+                                        <p:tgtEl>
+                                          <p:spTgt spid="19">
+                                            <p:txEl>
+                                              <p:pRg st="2" end="2"/>
+                                            </p:txEl>
+                                          </p:spTgt>
+                                        </p:tgtEl>
+                                        <p:attrNameLst>
+                                          <p:attrName>style.visibility</p:attrName>
+                                        </p:attrNameLst>
+                                      </p:cBhvr>
+                                      <p:to>
+                                        <p:strVal val="visible"/>
+                                      </p:to>
+                                    </p:set>
+                                    <p:animEffect transition="in" filter="fade">
+                                      <p:cBhvr>
+                                        <p:cTn id="37" dur="500"/>
+                                        <p:tgtEl>
+                                          <p:spTgt spid="19">
+                                            <p:txEl>
+                                              <p:pRg st="2" end="2"/>
+                                            </p:txEl>
+                                          </p:spTgt>
+                                        </p:tgtEl>
+                                      </p:cBhvr>
+                                    </p:animEffect>
+                                  </p:childTnLst>
+                                </p:cTn>
+                              </p:par>
+                            </p:childTnLst>
+                          </p:cTn>
+                        </p:par>
+                      </p:childTnLst>
+                    </p:cTn>
+                  </p:par>
+                  <p:par>
+                    <p:cTn id="38" fill="hold">
+                      <p:stCondLst>
+                        <p:cond delay="indefinite"/>
+                      </p:stCondLst>
+                      <p:childTnLst>
+                        <p:par>
+                          <p:cTn id="39" fill="hold">
+                            <p:stCondLst>
+                              <p:cond delay="0"/>
+                            </p:stCondLst>
+                            <p:childTnLst>
+                              <p:par>
+                                <p:cTn id="40" presetID="10" presetClass="entr" presetSubtype="0" fill="hold" nodeType="clickEffect">
+                                  <p:stCondLst>
+                                    <p:cond delay="0"/>
+                                  </p:stCondLst>
+                                  <p:childTnLst>
+                                    <p:set>
+                                      <p:cBhvr>
+                                        <p:cTn id="41" dur="1" fill="hold">
+                                          <p:stCondLst>
+                                            <p:cond delay="0"/>
+                                          </p:stCondLst>
+                                        </p:cTn>
+                                        <p:tgtEl>
+                                          <p:spTgt spid="19">
+                                            <p:txEl>
+                                              <p:pRg st="3" end="3"/>
+                                            </p:txEl>
+                                          </p:spTgt>
+                                        </p:tgtEl>
+                                        <p:attrNameLst>
+                                          <p:attrName>style.visibility</p:attrName>
+                                        </p:attrNameLst>
+                                      </p:cBhvr>
+                                      <p:to>
+                                        <p:strVal val="visible"/>
+                                      </p:to>
+                                    </p:set>
+                                    <p:animEffect transition="in" filter="fade">
+                                      <p:cBhvr>
+                                        <p:cTn id="42" dur="500"/>
+                                        <p:tgtEl>
+                                          <p:spTgt spid="19">
+                                            <p:txEl>
+                                              <p:pRg st="3" end="3"/>
+                                            </p:txEl>
+                                          </p:spTgt>
+                                        </p:tgtEl>
+                                      </p:cBhvr>
+                                    </p:animEffect>
+                                  </p:childTnLst>
+                                </p:cTn>
+                              </p:par>
+                            </p:childTnLst>
+                          </p:cTn>
+                        </p:par>
+                      </p:childTnLst>
+                    </p:cTn>
+                  </p:par>
+                  <p:par>
+                    <p:cTn id="43" fill="hold">
+                      <p:stCondLst>
+                        <p:cond delay="indefinite"/>
+                      </p:stCondLst>
+                      <p:childTnLst>
+                        <p:par>
+                          <p:cTn id="44" fill="hold">
+                            <p:stCondLst>
+                              <p:cond delay="0"/>
+                            </p:stCondLst>
+                            <p:childTnLst>
+                              <p:par>
+                                <p:cTn id="45" presetID="10" presetClass="entr" presetSubtype="0" fill="hold" nodeType="clickEffect">
+                                  <p:stCondLst>
+                                    <p:cond delay="0"/>
+                                  </p:stCondLst>
+                                  <p:childTnLst>
+                                    <p:set>
+                                      <p:cBhvr>
+                                        <p:cTn id="46" dur="1" fill="hold">
+                                          <p:stCondLst>
+                                            <p:cond delay="0"/>
+                                          </p:stCondLst>
+                                        </p:cTn>
+                                        <p:tgtEl>
+                                          <p:spTgt spid="21"/>
+                                        </p:tgtEl>
+                                        <p:attrNameLst>
+                                          <p:attrName>style.visibility</p:attrName>
+                                        </p:attrNameLst>
+                                      </p:cBhvr>
+                                      <p:to>
+                                        <p:strVal val="visible"/>
+                                      </p:to>
+                                    </p:set>
+                                    <p:animEffect transition="in" filter="fade">
+                                      <p:cBhvr>
+                                        <p:cTn id="47" dur="500"/>
+                                        <p:tgtEl>
+                                          <p:spTgt spid="21"/>
+                                        </p:tgtEl>
+                                      </p:cBhvr>
+                                    </p:animEffect>
+                                  </p:childTnLst>
+                                </p:cTn>
+                              </p:par>
+                            </p:childTnLst>
+                          </p:cTn>
+                        </p:par>
+                      </p:childTnLst>
+                    </p:cTn>
+                  </p:par>
+                </p:childTnLst>
+              </p:cTn>
+              <p:prevCondLst>
+                <p:cond evt="onPrev" delay="0">
+                  <p:tgtEl>
+                    <p:sldTgt/>
+                  </p:tgtEl>
+                </p:cond>
+              </p:prevCondLst>
+              <p:nextCondLst>
+                <p:cond evt="onNext" delay="0">
+                  <p:tgtEl>
+                    <p:sldTgt/>
+                  </p:tgtEl>
+                </p:cond>
+              </p:nextCondLst>
+            </p:seq>
+          </p:childTnLst>
+        </p:cTn>
+      </p:par>
+    </p:tnLst>
+    <p:bldLst>
+      <p:bldP spid="17" grpId="0"/>
+    </p:bldLst>
+  </p:timing>
 </p:sld>
 </file>
 

</xml_diff>